<commit_message>
Updated types of data slides
</commit_message>
<xml_diff>
--- a/slides/01_types_of_data.pptx
+++ b/slides/01_types_of_data.pptx
@@ -252,7 +252,7 @@
             <a:fld id="{CF919163-F0F1-41A2-8AEB-FD5A4E83B2BC}" type="datetime1">
               <a:rPr lang="en-US" altLang="en-US"/>
               <a:pPr/>
-              <a:t>8/12/2015</a:t>
+              <a:t>10/17/15</a:t>
             </a:fld>
             <a:endParaRPr lang="en-US" altLang="en-US"/>
           </a:p>
@@ -502,7 +502,7 @@
             <a:tailEnd/>
           </a:ln>
           <a:extLst>
-            <a:ext uri="{909E8E84-426E-40DD-AFC4-6F175D3DCCD1}">
+            <a:ext uri="{909E8E84-426E-40dd-AFC4-6F175D3DCCD1}">
               <a14:hiddenFill xmlns:a14="http://schemas.microsoft.com/office/drawing/2010/main">
                 <a:solidFill>
                   <a:srgbClr val="FFFFFF"/>
@@ -845,14 +845,14 @@
           <a:noFill/>
           <a:ln/>
           <a:extLst>
-            <a:ext uri="{909E8E84-426E-40DD-AFC4-6F175D3DCCD1}">
+            <a:ext uri="{909E8E84-426E-40dd-AFC4-6F175D3DCCD1}">
               <a14:hiddenFill xmlns:a14="http://schemas.microsoft.com/office/drawing/2010/main">
                 <a:solidFill>
                   <a:srgbClr val="FFFFFF"/>
                 </a:solidFill>
               </a14:hiddenFill>
             </a:ext>
-            <a:ext uri="{91240B29-F687-4F45-9708-019B960494DF}">
+            <a:ext uri="{91240B29-F687-4f45-9708-019B960494DF}">
               <a14:hiddenLine xmlns:a14="http://schemas.microsoft.com/office/drawing/2010/main" w="9525">
                 <a:solidFill>
                   <a:srgbClr val="000000"/>
@@ -1074,14 +1074,14 @@
           <a:noFill/>
           <a:ln/>
           <a:extLst>
-            <a:ext uri="{909E8E84-426E-40DD-AFC4-6F175D3DCCD1}">
+            <a:ext uri="{909E8E84-426E-40dd-AFC4-6F175D3DCCD1}">
               <a14:hiddenFill xmlns:a14="http://schemas.microsoft.com/office/drawing/2010/main">
                 <a:solidFill>
                   <a:srgbClr val="FFFFFF"/>
                 </a:solidFill>
               </a14:hiddenFill>
             </a:ext>
-            <a:ext uri="{91240B29-F687-4F45-9708-019B960494DF}">
+            <a:ext uri="{91240B29-F687-4f45-9708-019B960494DF}">
               <a14:hiddenLine xmlns:a14="http://schemas.microsoft.com/office/drawing/2010/main" w="9525">
                 <a:solidFill>
                   <a:srgbClr val="000000"/>
@@ -1303,14 +1303,14 @@
           <a:noFill/>
           <a:ln/>
           <a:extLst>
-            <a:ext uri="{909E8E84-426E-40DD-AFC4-6F175D3DCCD1}">
+            <a:ext uri="{909E8E84-426E-40dd-AFC4-6F175D3DCCD1}">
               <a14:hiddenFill xmlns:a14="http://schemas.microsoft.com/office/drawing/2010/main">
                 <a:solidFill>
                   <a:srgbClr val="FFFFFF"/>
                 </a:solidFill>
               </a14:hiddenFill>
             </a:ext>
-            <a:ext uri="{91240B29-F687-4F45-9708-019B960494DF}">
+            <a:ext uri="{91240B29-F687-4f45-9708-019B960494DF}">
               <a14:hiddenLine xmlns:a14="http://schemas.microsoft.com/office/drawing/2010/main" w="9525">
                 <a:solidFill>
                   <a:srgbClr val="000000"/>
@@ -1532,14 +1532,14 @@
           <a:noFill/>
           <a:ln/>
           <a:extLst>
-            <a:ext uri="{909E8E84-426E-40DD-AFC4-6F175D3DCCD1}">
+            <a:ext uri="{909E8E84-426E-40dd-AFC4-6F175D3DCCD1}">
               <a14:hiddenFill xmlns:a14="http://schemas.microsoft.com/office/drawing/2010/main">
                 <a:solidFill>
                   <a:srgbClr val="FFFFFF"/>
                 </a:solidFill>
               </a14:hiddenFill>
             </a:ext>
-            <a:ext uri="{91240B29-F687-4F45-9708-019B960494DF}">
+            <a:ext uri="{91240B29-F687-4f45-9708-019B960494DF}">
               <a14:hiddenLine xmlns:a14="http://schemas.microsoft.com/office/drawing/2010/main" w="9525">
                 <a:solidFill>
                   <a:srgbClr val="000000"/>
@@ -1761,14 +1761,14 @@
           <a:noFill/>
           <a:ln/>
           <a:extLst>
-            <a:ext uri="{909E8E84-426E-40DD-AFC4-6F175D3DCCD1}">
+            <a:ext uri="{909E8E84-426E-40dd-AFC4-6F175D3DCCD1}">
               <a14:hiddenFill xmlns:a14="http://schemas.microsoft.com/office/drawing/2010/main">
                 <a:solidFill>
                   <a:srgbClr val="FFFFFF"/>
                 </a:solidFill>
               </a14:hiddenFill>
             </a:ext>
-            <a:ext uri="{91240B29-F687-4F45-9708-019B960494DF}">
+            <a:ext uri="{91240B29-F687-4f45-9708-019B960494DF}">
               <a14:hiddenLine xmlns:a14="http://schemas.microsoft.com/office/drawing/2010/main" w="9525">
                 <a:solidFill>
                   <a:srgbClr val="000000"/>
@@ -2004,14 +2004,14 @@
           <a:noFill/>
           <a:ln/>
           <a:extLst>
-            <a:ext uri="{909E8E84-426E-40DD-AFC4-6F175D3DCCD1}">
+            <a:ext uri="{909E8E84-426E-40dd-AFC4-6F175D3DCCD1}">
               <a14:hiddenFill xmlns:a14="http://schemas.microsoft.com/office/drawing/2010/main">
                 <a:solidFill>
                   <a:srgbClr val="FFFFFF"/>
                 </a:solidFill>
               </a14:hiddenFill>
             </a:ext>
-            <a:ext uri="{91240B29-F687-4F45-9708-019B960494DF}">
+            <a:ext uri="{91240B29-F687-4f45-9708-019B960494DF}">
               <a14:hiddenLine xmlns:a14="http://schemas.microsoft.com/office/drawing/2010/main" w="9525">
                 <a:solidFill>
                   <a:srgbClr val="000000"/>
@@ -2047,14 +2047,14 @@
           <a:noFill/>
           <a:ln/>
           <a:extLst>
-            <a:ext uri="{909E8E84-426E-40DD-AFC4-6F175D3DCCD1}">
+            <a:ext uri="{909E8E84-426E-40dd-AFC4-6F175D3DCCD1}">
               <a14:hiddenFill xmlns:a14="http://schemas.microsoft.com/office/drawing/2010/main">
                 <a:solidFill>
                   <a:srgbClr val="FFFFFF"/>
                 </a:solidFill>
               </a14:hiddenFill>
             </a:ext>
-            <a:ext uri="{91240B29-F687-4F45-9708-019B960494DF}">
+            <a:ext uri="{91240B29-F687-4f45-9708-019B960494DF}">
               <a14:hiddenLine xmlns:a14="http://schemas.microsoft.com/office/drawing/2010/main" w="9525">
                 <a:solidFill>
                   <a:srgbClr val="000000"/>
@@ -2224,14 +2224,14 @@
           <a:noFill/>
           <a:ln/>
           <a:extLst>
-            <a:ext uri="{909E8E84-426E-40DD-AFC4-6F175D3DCCD1}">
+            <a:ext uri="{909E8E84-426E-40dd-AFC4-6F175D3DCCD1}">
               <a14:hiddenFill xmlns:a14="http://schemas.microsoft.com/office/drawing/2010/main">
                 <a:solidFill>
                   <a:srgbClr val="FFFFFF"/>
                 </a:solidFill>
               </a14:hiddenFill>
             </a:ext>
-            <a:ext uri="{91240B29-F687-4F45-9708-019B960494DF}">
+            <a:ext uri="{91240B29-F687-4f45-9708-019B960494DF}">
               <a14:hiddenLine xmlns:a14="http://schemas.microsoft.com/office/drawing/2010/main" w="9525">
                 <a:solidFill>
                   <a:srgbClr val="000000"/>
@@ -5411,14 +5411,14 @@
             <a:noFill/>
           </a:ln>
           <a:extLst>
-            <a:ext uri="{909E8E84-426E-40DD-AFC4-6F175D3DCCD1}">
+            <a:ext uri="{909E8E84-426E-40dd-AFC4-6F175D3DCCD1}">
               <a14:hiddenFill xmlns:a14="http://schemas.microsoft.com/office/drawing/2010/main">
                 <a:solidFill>
                   <a:srgbClr val="FFFFFF"/>
                 </a:solidFill>
               </a14:hiddenFill>
             </a:ext>
-            <a:ext uri="{91240B29-F687-4F45-9708-019B960494DF}">
+            <a:ext uri="{91240B29-F687-4f45-9708-019B960494DF}">
               <a14:hiddenLine xmlns:a14="http://schemas.microsoft.com/office/drawing/2010/main" w="9525">
                 <a:solidFill>
                   <a:srgbClr val="000000"/>
@@ -5469,14 +5469,14 @@
             <a:noFill/>
           </a:ln>
           <a:extLst>
-            <a:ext uri="{909E8E84-426E-40DD-AFC4-6F175D3DCCD1}">
+            <a:ext uri="{909E8E84-426E-40dd-AFC4-6F175D3DCCD1}">
               <a14:hiddenFill xmlns:a14="http://schemas.microsoft.com/office/drawing/2010/main">
                 <a:solidFill>
                   <a:srgbClr val="FFFFFF"/>
                 </a:solidFill>
               </a14:hiddenFill>
             </a:ext>
-            <a:ext uri="{91240B29-F687-4F45-9708-019B960494DF}">
+            <a:ext uri="{91240B29-F687-4f45-9708-019B960494DF}">
               <a14:hiddenLine xmlns:a14="http://schemas.microsoft.com/office/drawing/2010/main" w="9525">
                 <a:solidFill>
                   <a:srgbClr val="000000"/>
@@ -6115,14 +6115,14 @@
           <a:noFill/>
           <a:ln/>
           <a:extLst>
-            <a:ext uri="{909E8E84-426E-40DD-AFC4-6F175D3DCCD1}">
+            <a:ext uri="{909E8E84-426E-40dd-AFC4-6F175D3DCCD1}">
               <a14:hiddenFill xmlns:a14="http://schemas.microsoft.com/office/drawing/2010/main">
                 <a:solidFill>
                   <a:srgbClr val="FFFFFF"/>
                 </a:solidFill>
               </a14:hiddenFill>
             </a:ext>
-            <a:ext uri="{91240B29-F687-4F45-9708-019B960494DF}">
+            <a:ext uri="{91240B29-F687-4f45-9708-019B960494DF}">
               <a14:hiddenLine xmlns:a14="http://schemas.microsoft.com/office/drawing/2010/main" w="9525">
                 <a:solidFill>
                   <a:srgbClr val="000000"/>
@@ -6273,17 +6273,17 @@
           <a:p>
             <a:pPr eaLnBrk="1" hangingPunct="1"/>
             <a:r>
-              <a:rPr lang="en-US" altLang="en-US" smtClean="0"/>
+              <a:rPr lang="en-US" altLang="en-US" dirty="0" smtClean="0"/>
               <a:t>Topic 1:</a:t>
             </a:r>
             <a:br>
-              <a:rPr lang="en-US" altLang="en-US" smtClean="0"/>
+              <a:rPr lang="en-US" altLang="en-US" dirty="0" smtClean="0"/>
             </a:br>
             <a:r>
-              <a:rPr lang="en-US" altLang="en-US" smtClean="0"/>
+              <a:rPr lang="en-US" altLang="en-US" dirty="0" smtClean="0"/>
               <a:t>Introduction to Data Mining</a:t>
             </a:r>
-            <a:endParaRPr lang="en-US" altLang="en-US" sz="1400" smtClean="0">
+            <a:endParaRPr lang="en-US" altLang="en-US" sz="1400" dirty="0" smtClean="0">
               <a:solidFill>
                 <a:schemeClr val="tx1"/>
               </a:solidFill>
@@ -6309,10 +6309,14 @@
           <a:p>
             <a:pPr eaLnBrk="1" hangingPunct="1"/>
             <a:r>
-              <a:rPr lang="en-US" altLang="en-US" smtClean="0"/>
-              <a:t>Instructor:  Chris Volinsky</a:t>
+              <a:rPr lang="en-US" altLang="en-US" dirty="0" smtClean="0"/>
+              <a:t>Credits:  Chris </a:t>
             </a:r>
-            <a:endParaRPr lang="en-GB" altLang="en-US" smtClean="0"/>
+            <a:r>
+              <a:rPr lang="en-US" altLang="en-US" dirty="0" err="1" smtClean="0"/>
+              <a:t>Volinsky</a:t>
+            </a:r>
+            <a:endParaRPr lang="en-GB" altLang="en-US" dirty="0" smtClean="0"/>
           </a:p>
         </p:txBody>
       </p:sp>
@@ -6330,14 +6334,14 @@
           <a:noFill/>
           <a:ln/>
           <a:extLst>
-            <a:ext uri="{909E8E84-426E-40DD-AFC4-6F175D3DCCD1}">
+            <a:ext uri="{909E8E84-426E-40dd-AFC4-6F175D3DCCD1}">
               <a14:hiddenFill xmlns:a14="http://schemas.microsoft.com/office/drawing/2010/main">
                 <a:solidFill>
                   <a:srgbClr val="FFFFFF"/>
                 </a:solidFill>
               </a14:hiddenFill>
             </a:ext>
-            <a:ext uri="{91240B29-F687-4F45-9708-019B960494DF}">
+            <a:ext uri="{91240B29-F687-4f45-9708-019B960494DF}">
               <a14:hiddenLine xmlns:a14="http://schemas.microsoft.com/office/drawing/2010/main" w="9525">
                 <a:solidFill>
                   <a:srgbClr val="000000"/>
@@ -6481,7 +6485,7 @@
   <p:timing>
     <p:tnLst>
       <p:par>
-        <p:cTn id="1" dur="indefinite" restart="never" nodeType="tmRoot"/>
+        <p:cTn xmlns:p14="http://schemas.microsoft.com/office/powerpoint/2010/main" id="1" dur="indefinite" restart="never" nodeType="tmRoot"/>
       </p:par>
     </p:tnLst>
   </p:timing>
@@ -6519,14 +6523,14 @@
           <a:noFill/>
           <a:ln/>
           <a:extLst>
-            <a:ext uri="{909E8E84-426E-40DD-AFC4-6F175D3DCCD1}">
+            <a:ext uri="{909E8E84-426E-40dd-AFC4-6F175D3DCCD1}">
               <a14:hiddenFill xmlns:a14="http://schemas.microsoft.com/office/drawing/2010/main">
                 <a:solidFill>
                   <a:srgbClr val="FFFFFF"/>
                 </a:solidFill>
               </a14:hiddenFill>
             </a:ext>
-            <a:ext uri="{91240B29-F687-4F45-9708-019B960494DF}">
+            <a:ext uri="{91240B29-F687-4f45-9708-019B960494DF}">
               <a14:hiddenLine xmlns:a14="http://schemas.microsoft.com/office/drawing/2010/main" w="9525">
                 <a:solidFill>
                   <a:srgbClr val="000000"/>
@@ -6734,14 +6738,14 @@
             <a:noFill/>
           </a:ln>
           <a:extLst>
-            <a:ext uri="{909E8E84-426E-40DD-AFC4-6F175D3DCCD1}">
+            <a:ext uri="{909E8E84-426E-40dd-AFC4-6F175D3DCCD1}">
               <a14:hiddenFill xmlns:a14="http://schemas.microsoft.com/office/drawing/2010/main">
                 <a:solidFill>
                   <a:srgbClr val="FFFFFF"/>
                 </a:solidFill>
               </a14:hiddenFill>
             </a:ext>
-            <a:ext uri="{91240B29-F687-4F45-9708-019B960494DF}">
+            <a:ext uri="{91240B29-F687-4f45-9708-019B960494DF}">
               <a14:hiddenLine xmlns:a14="http://schemas.microsoft.com/office/drawing/2010/main" w="9525">
                 <a:solidFill>
                   <a:srgbClr val="000000"/>
@@ -6956,14 +6960,14 @@
           <a:noFill/>
           <a:ln/>
           <a:extLst>
-            <a:ext uri="{909E8E84-426E-40DD-AFC4-6F175D3DCCD1}">
+            <a:ext uri="{909E8E84-426E-40dd-AFC4-6F175D3DCCD1}">
               <a14:hiddenFill xmlns:a14="http://schemas.microsoft.com/office/drawing/2010/main">
                 <a:solidFill>
                   <a:srgbClr val="FFFFFF"/>
                 </a:solidFill>
               </a14:hiddenFill>
             </a:ext>
-            <a:ext uri="{91240B29-F687-4F45-9708-019B960494DF}">
+            <a:ext uri="{91240B29-F687-4f45-9708-019B960494DF}">
               <a14:hiddenLine xmlns:a14="http://schemas.microsoft.com/office/drawing/2010/main" w="9525">
                 <a:solidFill>
                   <a:srgbClr val="000000"/>
@@ -7102,7 +7106,7 @@
   <p:timing>
     <p:tnLst>
       <p:par>
-        <p:cTn id="1" dur="indefinite" restart="never" nodeType="tmRoot"/>
+        <p:cTn xmlns:p14="http://schemas.microsoft.com/office/powerpoint/2010/main" id="1" dur="indefinite" restart="never" nodeType="tmRoot"/>
       </p:par>
     </p:tnLst>
   </p:timing>
@@ -7140,14 +7144,14 @@
           <a:noFill/>
           <a:ln/>
           <a:extLst>
-            <a:ext uri="{909E8E84-426E-40DD-AFC4-6F175D3DCCD1}">
+            <a:ext uri="{909E8E84-426E-40dd-AFC4-6F175D3DCCD1}">
               <a14:hiddenFill xmlns:a14="http://schemas.microsoft.com/office/drawing/2010/main">
                 <a:solidFill>
                   <a:srgbClr val="FFFFFF"/>
                 </a:solidFill>
               </a14:hiddenFill>
             </a:ext>
-            <a:ext uri="{91240B29-F687-4F45-9708-019B960494DF}">
+            <a:ext uri="{91240B29-F687-4f45-9708-019B960494DF}">
               <a14:hiddenLine xmlns:a14="http://schemas.microsoft.com/office/drawing/2010/main" w="9525">
                 <a:solidFill>
                   <a:srgbClr val="000000"/>
@@ -7348,13 +7352,8 @@
             </a:pPr>
             <a:r>
               <a:rPr lang="en-US" altLang="en-US" sz="2000" smtClean="0"/>
-              <a:t>Both n and p can be very large in data </a:t>
+              <a:t>Both n and p can be very large in data mining</a:t>
             </a:r>
-            <a:r>
-              <a:rPr lang="en-US" altLang="en-US" sz="2000" smtClean="0"/>
-              <a:t>mining</a:t>
-            </a:r>
-            <a:endParaRPr lang="en-US" altLang="en-US" sz="2000" smtClean="0"/>
           </a:p>
         </p:txBody>
       </p:sp>
@@ -7387,7 +7386,7 @@
             <a:tailEnd/>
           </a:ln>
           <a:extLst>
-            <a:ext uri="{909E8E84-426E-40DD-AFC4-6F175D3DCCD1}">
+            <a:ext uri="{909E8E84-426E-40dd-AFC4-6F175D3DCCD1}">
               <a14:hiddenFill xmlns:a14="http://schemas.microsoft.com/office/drawing/2010/main">
                 <a:solidFill>
                   <a:srgbClr val="FFFFFF"/>
@@ -7539,7 +7538,7 @@
             <a:tailEnd/>
           </a:ln>
           <a:extLst>
-            <a:ext uri="{909E8E84-426E-40DD-AFC4-6F175D3DCCD1}">
+            <a:ext uri="{909E8E84-426E-40dd-AFC4-6F175D3DCCD1}">
               <a14:hiddenFill xmlns:a14="http://schemas.microsoft.com/office/drawing/2010/main">
                 <a:solidFill>
                   <a:srgbClr val="FFFFFF"/>
@@ -7683,14 +7682,14 @@
             <a:noFill/>
           </a:ln>
           <a:extLst>
-            <a:ext uri="{909E8E84-426E-40DD-AFC4-6F175D3DCCD1}">
+            <a:ext uri="{909E8E84-426E-40dd-AFC4-6F175D3DCCD1}">
               <a14:hiddenFill xmlns:a14="http://schemas.microsoft.com/office/drawing/2010/main">
                 <a:solidFill>
                   <a:srgbClr val="FFFFFF"/>
                 </a:solidFill>
               </a14:hiddenFill>
             </a:ext>
-            <a:ext uri="{91240B29-F687-4F45-9708-019B960494DF}">
+            <a:ext uri="{91240B29-F687-4f45-9708-019B960494DF}">
               <a14:hiddenLine xmlns:a14="http://schemas.microsoft.com/office/drawing/2010/main" w="9525">
                 <a:solidFill>
                   <a:srgbClr val="000000"/>
@@ -7852,14 +7851,14 @@
             <a:noFill/>
           </a:ln>
           <a:extLst>
-            <a:ext uri="{909E8E84-426E-40DD-AFC4-6F175D3DCCD1}">
+            <a:ext uri="{909E8E84-426E-40dd-AFC4-6F175D3DCCD1}">
               <a14:hiddenFill xmlns:a14="http://schemas.microsoft.com/office/drawing/2010/main">
                 <a:solidFill>
                   <a:srgbClr val="FFFFFF"/>
                 </a:solidFill>
               </a14:hiddenFill>
             </a:ext>
-            <a:ext uri="{91240B29-F687-4F45-9708-019B960494DF}">
+            <a:ext uri="{91240B29-F687-4f45-9708-019B960494DF}">
               <a14:hiddenLine xmlns:a14="http://schemas.microsoft.com/office/drawing/2010/main" w="9525">
                 <a:solidFill>
                   <a:srgbClr val="000000"/>
@@ -8016,7 +8015,7 @@
           <a:graphicData uri="http://schemas.openxmlformats.org/presentationml/2006/ole">
             <mc:AlternateContent xmlns:mc="http://schemas.openxmlformats.org/markup-compatibility/2006">
               <mc:Choice xmlns:v="urn:schemas-microsoft-com:vml" Requires="v">
-                <p:oleObj spid="_x0000_s36884" name="Document" r:id="rId4" imgW="5664200" imgH="1828800" progId="Word.Document.8">
+                <p:oleObj spid="_x0000_s36886" name="Document" r:id="rId4" imgW="5664200" imgH="1828800" progId="Word.Document.8">
                   <p:embed/>
                 </p:oleObj>
               </mc:Choice>
@@ -8058,14 +8057,14 @@
                       </a:ln>
                       <a:effectLst/>
                       <a:extLst>
-                        <a:ext uri="{909E8E84-426E-40DD-AFC4-6F175D3DCCD1}">
+                        <a:ext uri="{909E8E84-426E-40dd-AFC4-6F175D3DCCD1}">
                           <a14:hiddenFill xmlns:a14="http://schemas.microsoft.com/office/drawing/2010/main">
                             <a:solidFill>
                               <a:schemeClr val="accent1"/>
                             </a:solidFill>
                           </a14:hiddenFill>
                         </a:ext>
-                        <a:ext uri="{91240B29-F687-4F45-9708-019B960494DF}">
+                        <a:ext uri="{91240B29-F687-4f45-9708-019B960494DF}">
                           <a14:hiddenLine xmlns:a14="http://schemas.microsoft.com/office/drawing/2010/main" w="9525">
                             <a:solidFill>
                               <a:schemeClr val="tx1"/>
@@ -8075,7 +8074,7 @@
                             <a:tailEnd/>
                           </a14:hiddenLine>
                         </a:ext>
-                        <a:ext uri="{AF507438-7753-43E0-B8FC-AC1667EBCBE1}">
+                        <a:ext uri="{AF507438-7753-43e0-B8FC-AC1667EBCBE1}">
                           <a14:hiddenEffects xmlns:a14="http://schemas.microsoft.com/office/drawing/2010/main">
                             <a:effectLst>
                               <a:outerShdw dist="35921" dir="2700000" algn="ctr" rotWithShape="0">
@@ -8109,14 +8108,14 @@
           <a:noFill/>
           <a:ln/>
           <a:extLst>
-            <a:ext uri="{909E8E84-426E-40DD-AFC4-6F175D3DCCD1}">
+            <a:ext uri="{909E8E84-426E-40dd-AFC4-6F175D3DCCD1}">
               <a14:hiddenFill xmlns:a14="http://schemas.microsoft.com/office/drawing/2010/main">
                 <a:solidFill>
                   <a:srgbClr val="FFFFFF"/>
                 </a:solidFill>
               </a14:hiddenFill>
             </a:ext>
-            <a:ext uri="{91240B29-F687-4F45-9708-019B960494DF}">
+            <a:ext uri="{91240B29-F687-4f45-9708-019B960494DF}">
               <a14:hiddenLine xmlns:a14="http://schemas.microsoft.com/office/drawing/2010/main" w="9525">
                 <a:solidFill>
                   <a:srgbClr val="000000"/>
@@ -8255,7 +8254,7 @@
   <p:timing>
     <p:tnLst>
       <p:par>
-        <p:cTn id="1" dur="indefinite" restart="never" nodeType="tmRoot"/>
+        <p:cTn xmlns:p14="http://schemas.microsoft.com/office/powerpoint/2010/main" id="1" dur="indefinite" restart="never" nodeType="tmRoot"/>
       </p:par>
     </p:tnLst>
   </p:timing>
@@ -8293,14 +8292,14 @@
           <a:noFill/>
           <a:ln/>
           <a:extLst>
-            <a:ext uri="{909E8E84-426E-40DD-AFC4-6F175D3DCCD1}">
+            <a:ext uri="{909E8E84-426E-40dd-AFC4-6F175D3DCCD1}">
               <a14:hiddenFill xmlns:a14="http://schemas.microsoft.com/office/drawing/2010/main">
                 <a:solidFill>
                   <a:srgbClr val="FFFFFF"/>
                 </a:solidFill>
               </a14:hiddenFill>
             </a:ext>
-            <a:ext uri="{91240B29-F687-4F45-9708-019B960494DF}">
+            <a:ext uri="{91240B29-F687-4f45-9708-019B960494DF}">
               <a14:hiddenLine xmlns:a14="http://schemas.microsoft.com/office/drawing/2010/main" w="9525">
                 <a:solidFill>
                   <a:srgbClr val="000000"/>
@@ -8508,14 +8507,14 @@
             <a:noFill/>
           </a:ln>
           <a:extLst>
-            <a:ext uri="{909E8E84-426E-40DD-AFC4-6F175D3DCCD1}">
+            <a:ext uri="{909E8E84-426E-40dd-AFC4-6F175D3DCCD1}">
               <a14:hiddenFill xmlns:a14="http://schemas.microsoft.com/office/drawing/2010/main">
                 <a:solidFill>
                   <a:srgbClr val="FFFFFF"/>
                 </a:solidFill>
               </a14:hiddenFill>
             </a:ext>
-            <a:ext uri="{91240B29-F687-4F45-9708-019B960494DF}">
+            <a:ext uri="{91240B29-F687-4f45-9708-019B960494DF}">
               <a14:hiddenLine xmlns:a14="http://schemas.microsoft.com/office/drawing/2010/main" w="9525">
                 <a:solidFill>
                   <a:srgbClr val="000000"/>
@@ -8675,14 +8674,14 @@
             <a:noFill/>
           </a:ln>
           <a:extLst>
-            <a:ext uri="{909E8E84-426E-40DD-AFC4-6F175D3DCCD1}">
+            <a:ext uri="{909E8E84-426E-40dd-AFC4-6F175D3DCCD1}">
               <a14:hiddenFill xmlns:a14="http://schemas.microsoft.com/office/drawing/2010/main">
                 <a:solidFill>
                   <a:srgbClr val="FFFFFF"/>
                 </a:solidFill>
               </a14:hiddenFill>
             </a:ext>
-            <a:ext uri="{91240B29-F687-4F45-9708-019B960494DF}">
+            <a:ext uri="{91240B29-F687-4f45-9708-019B960494DF}">
               <a14:hiddenLine xmlns:a14="http://schemas.microsoft.com/office/drawing/2010/main" w="9525">
                 <a:solidFill>
                   <a:srgbClr val="000000"/>
@@ -8841,14 +8840,14 @@
           <a:noFill/>
           <a:ln/>
           <a:extLst>
-            <a:ext uri="{909E8E84-426E-40DD-AFC4-6F175D3DCCD1}">
+            <a:ext uri="{909E8E84-426E-40dd-AFC4-6F175D3DCCD1}">
               <a14:hiddenFill xmlns:a14="http://schemas.microsoft.com/office/drawing/2010/main">
                 <a:solidFill>
                   <a:srgbClr val="FFFFFF"/>
                 </a:solidFill>
               </a14:hiddenFill>
             </a:ext>
-            <a:ext uri="{91240B29-F687-4F45-9708-019B960494DF}">
+            <a:ext uri="{91240B29-F687-4f45-9708-019B960494DF}">
               <a14:hiddenLine xmlns:a14="http://schemas.microsoft.com/office/drawing/2010/main" w="9525">
                 <a:solidFill>
                   <a:srgbClr val="000000"/>
@@ -9230,7 +9229,7 @@
             <a:tailEnd type="triangle" w="med" len="med"/>
           </a:ln>
           <a:extLst>
-            <a:ext uri="{909E8E84-426E-40DD-AFC4-6F175D3DCCD1}">
+            <a:ext uri="{909E8E84-426E-40dd-AFC4-6F175D3DCCD1}">
               <a14:hiddenFill xmlns:a14="http://schemas.microsoft.com/office/drawing/2010/main">
                 <a:solidFill>
                   <a:srgbClr val="FFFFFF"/>
@@ -9255,7 +9254,7 @@
   <p:timing>
     <p:tnLst>
       <p:par>
-        <p:cTn id="1" dur="indefinite" restart="never" nodeType="tmRoot"/>
+        <p:cTn xmlns:p14="http://schemas.microsoft.com/office/powerpoint/2010/main" id="1" dur="indefinite" restart="never" nodeType="tmRoot"/>
       </p:par>
     </p:tnLst>
   </p:timing>
@@ -9349,7 +9348,7 @@
             <a:tailEnd/>
           </a:ln>
           <a:extLst>
-            <a:ext uri="{909E8E84-426E-40DD-AFC4-6F175D3DCCD1}">
+            <a:ext uri="{909E8E84-426E-40dd-AFC4-6F175D3DCCD1}">
               <a14:hiddenFill xmlns:a14="http://schemas.microsoft.com/office/drawing/2010/main">
                 <a:solidFill>
                   <a:srgbClr val="FFFFFF"/>
@@ -9595,14 +9594,14 @@
             <a:noFill/>
           </a:ln>
           <a:extLst>
-            <a:ext uri="{909E8E84-426E-40DD-AFC4-6F175D3DCCD1}">
+            <a:ext uri="{909E8E84-426E-40dd-AFC4-6F175D3DCCD1}">
               <a14:hiddenFill xmlns:a14="http://schemas.microsoft.com/office/drawing/2010/main">
                 <a:solidFill>
                   <a:srgbClr val="FFFFFF"/>
                 </a:solidFill>
               </a14:hiddenFill>
             </a:ext>
-            <a:ext uri="{91240B29-F687-4F45-9708-019B960494DF}">
+            <a:ext uri="{91240B29-F687-4f45-9708-019B960494DF}">
               <a14:hiddenLine xmlns:a14="http://schemas.microsoft.com/office/drawing/2010/main" w="9525">
                 <a:solidFill>
                   <a:srgbClr val="000000"/>
@@ -9775,7 +9774,7 @@
             <a:tailEnd/>
           </a:ln>
           <a:extLst>
-            <a:ext uri="{909E8E84-426E-40DD-AFC4-6F175D3DCCD1}">
+            <a:ext uri="{909E8E84-426E-40dd-AFC4-6F175D3DCCD1}">
               <a14:hiddenFill xmlns:a14="http://schemas.microsoft.com/office/drawing/2010/main">
                 <a:solidFill>
                   <a:srgbClr val="FFFFFF"/>
@@ -9977,7 +9976,7 @@
             <a:tailEnd/>
           </a:ln>
           <a:extLst>
-            <a:ext uri="{909E8E84-426E-40DD-AFC4-6F175D3DCCD1}">
+            <a:ext uri="{909E8E84-426E-40dd-AFC4-6F175D3DCCD1}">
               <a14:hiddenFill xmlns:a14="http://schemas.microsoft.com/office/drawing/2010/main">
                 <a:solidFill>
                   <a:srgbClr val="FFFFFF"/>
@@ -10165,7 +10164,7 @@
             <a:tailEnd type="arrow" w="med" len="med"/>
           </a:ln>
           <a:extLst>
-            <a:ext uri="{909E8E84-426E-40DD-AFC4-6F175D3DCCD1}">
+            <a:ext uri="{909E8E84-426E-40dd-AFC4-6F175D3DCCD1}">
               <a14:hiddenFill xmlns:a14="http://schemas.microsoft.com/office/drawing/2010/main">
                 <a:noFill/>
               </a14:hiddenFill>
@@ -10199,7 +10198,7 @@
             <a:tailEnd type="arrow" w="med" len="med"/>
           </a:ln>
           <a:extLst>
-            <a:ext uri="{909E8E84-426E-40DD-AFC4-6F175D3DCCD1}">
+            <a:ext uri="{909E8E84-426E-40dd-AFC4-6F175D3DCCD1}">
               <a14:hiddenFill xmlns:a14="http://schemas.microsoft.com/office/drawing/2010/main">
                 <a:noFill/>
               </a14:hiddenFill>
@@ -10221,14 +10220,14 @@
           <a:noFill/>
           <a:ln/>
           <a:extLst>
-            <a:ext uri="{909E8E84-426E-40DD-AFC4-6F175D3DCCD1}">
+            <a:ext uri="{909E8E84-426E-40dd-AFC4-6F175D3DCCD1}">
               <a14:hiddenFill xmlns:a14="http://schemas.microsoft.com/office/drawing/2010/main">
                 <a:solidFill>
                   <a:srgbClr val="FFFFFF"/>
                 </a:solidFill>
               </a14:hiddenFill>
             </a:ext>
-            <a:ext uri="{91240B29-F687-4F45-9708-019B960494DF}">
+            <a:ext uri="{91240B29-F687-4f45-9708-019B960494DF}">
               <a14:hiddenLine xmlns:a14="http://schemas.microsoft.com/office/drawing/2010/main" w="9525">
                 <a:solidFill>
                   <a:srgbClr val="000000"/>
@@ -10378,14 +10377,14 @@
             <a:noFill/>
           </a:ln>
           <a:extLst>
-            <a:ext uri="{909E8E84-426E-40DD-AFC4-6F175D3DCCD1}">
+            <a:ext uri="{909E8E84-426E-40dd-AFC4-6F175D3DCCD1}">
               <a14:hiddenFill xmlns:a14="http://schemas.microsoft.com/office/drawing/2010/main">
                 <a:solidFill>
                   <a:srgbClr val="FFFFFF"/>
                 </a:solidFill>
               </a14:hiddenFill>
             </a:ext>
-            <a:ext uri="{91240B29-F687-4F45-9708-019B960494DF}">
+            <a:ext uri="{91240B29-F687-4f45-9708-019B960494DF}">
               <a14:hiddenLine xmlns:a14="http://schemas.microsoft.com/office/drawing/2010/main" w="9525">
                 <a:solidFill>
                   <a:srgbClr val="000000"/>
@@ -10549,14 +10548,14 @@
           <a:noFill/>
           <a:ln/>
           <a:extLst>
-            <a:ext uri="{909E8E84-426E-40DD-AFC4-6F175D3DCCD1}">
+            <a:ext uri="{909E8E84-426E-40dd-AFC4-6F175D3DCCD1}">
               <a14:hiddenFill xmlns:a14="http://schemas.microsoft.com/office/drawing/2010/main">
                 <a:solidFill>
                   <a:srgbClr val="FFFFFF"/>
                 </a:solidFill>
               </a14:hiddenFill>
             </a:ext>
-            <a:ext uri="{91240B29-F687-4F45-9708-019B960494DF}">
+            <a:ext uri="{91240B29-F687-4f45-9708-019B960494DF}">
               <a14:hiddenLine xmlns:a14="http://schemas.microsoft.com/office/drawing/2010/main" w="9525">
                 <a:solidFill>
                   <a:srgbClr val="000000"/>
@@ -10695,7 +10694,7 @@
   <p:timing>
     <p:tnLst>
       <p:par>
-        <p:cTn id="1" dur="indefinite" restart="never" nodeType="tmRoot"/>
+        <p:cTn xmlns:p14="http://schemas.microsoft.com/office/powerpoint/2010/main" id="1" dur="indefinite" restart="never" nodeType="tmRoot"/>
       </p:par>
     </p:tnLst>
   </p:timing>
@@ -10733,14 +10732,14 @@
           <a:noFill/>
           <a:ln/>
           <a:extLst>
-            <a:ext uri="{909E8E84-426E-40DD-AFC4-6F175D3DCCD1}">
+            <a:ext uri="{909E8E84-426E-40dd-AFC4-6F175D3DCCD1}">
               <a14:hiddenFill xmlns:a14="http://schemas.microsoft.com/office/drawing/2010/main">
                 <a:solidFill>
                   <a:srgbClr val="FFFFFF"/>
                 </a:solidFill>
               </a14:hiddenFill>
             </a:ext>
-            <a:ext uri="{91240B29-F687-4F45-9708-019B960494DF}">
+            <a:ext uri="{91240B29-F687-4f45-9708-019B960494DF}">
               <a14:hiddenLine xmlns:a14="http://schemas.microsoft.com/office/drawing/2010/main" w="9525">
                 <a:solidFill>
                   <a:srgbClr val="000000"/>
@@ -10906,14 +10905,14 @@
           <a:noFill/>
           <a:ln/>
           <a:extLst>
-            <a:ext uri="{909E8E84-426E-40DD-AFC4-6F175D3DCCD1}">
+            <a:ext uri="{909E8E84-426E-40dd-AFC4-6F175D3DCCD1}">
               <a14:hiddenFill xmlns:a14="http://schemas.microsoft.com/office/drawing/2010/main">
                 <a:solidFill>
                   <a:srgbClr val="FFFFFF"/>
                 </a:solidFill>
               </a14:hiddenFill>
             </a:ext>
-            <a:ext uri="{91240B29-F687-4F45-9708-019B960494DF}">
+            <a:ext uri="{91240B29-F687-4f45-9708-019B960494DF}">
               <a14:hiddenLine xmlns:a14="http://schemas.microsoft.com/office/drawing/2010/main" w="9525">
                 <a:solidFill>
                   <a:srgbClr val="000000"/>
@@ -11078,14 +11077,14 @@
             <a:noFill/>
           </a:ln>
           <a:extLst>
-            <a:ext uri="{909E8E84-426E-40DD-AFC4-6F175D3DCCD1}">
+            <a:ext uri="{909E8E84-426E-40dd-AFC4-6F175D3DCCD1}">
               <a14:hiddenFill xmlns:a14="http://schemas.microsoft.com/office/drawing/2010/main">
                 <a:solidFill>
                   <a:srgbClr val="FFFFFF"/>
                 </a:solidFill>
               </a14:hiddenFill>
             </a:ext>
-            <a:ext uri="{91240B29-F687-4F45-9708-019B960494DF}">
+            <a:ext uri="{91240B29-F687-4f45-9708-019B960494DF}">
               <a14:hiddenLine xmlns:a14="http://schemas.microsoft.com/office/drawing/2010/main" w="9525">
                 <a:solidFill>
                   <a:srgbClr val="000000"/>
@@ -11106,7 +11105,7 @@
   <p:timing>
     <p:tnLst>
       <p:par>
-        <p:cTn id="1" dur="indefinite" restart="never" nodeType="tmRoot"/>
+        <p:cTn xmlns:p14="http://schemas.microsoft.com/office/powerpoint/2010/main" id="1" dur="indefinite" restart="never" nodeType="tmRoot"/>
       </p:par>
     </p:tnLst>
   </p:timing>
@@ -11200,14 +11199,14 @@
           <a:noFill/>
           <a:ln/>
           <a:extLst>
-            <a:ext uri="{909E8E84-426E-40DD-AFC4-6F175D3DCCD1}">
+            <a:ext uri="{909E8E84-426E-40dd-AFC4-6F175D3DCCD1}">
               <a14:hiddenFill xmlns:a14="http://schemas.microsoft.com/office/drawing/2010/main">
                 <a:solidFill>
                   <a:srgbClr val="FFFFFF"/>
                 </a:solidFill>
               </a14:hiddenFill>
             </a:ext>
-            <a:ext uri="{91240B29-F687-4F45-9708-019B960494DF}">
+            <a:ext uri="{91240B29-F687-4f45-9708-019B960494DF}">
               <a14:hiddenLine xmlns:a14="http://schemas.microsoft.com/office/drawing/2010/main" w="9525">
                 <a:solidFill>
                   <a:srgbClr val="000000"/>
@@ -11362,7 +11361,7 @@
             <a:tailEnd/>
           </a:ln>
           <a:extLst>
-            <a:ext uri="{909E8E84-426E-40DD-AFC4-6F175D3DCCD1}">
+            <a:ext uri="{909E8E84-426E-40dd-AFC4-6F175D3DCCD1}">
               <a14:hiddenFill xmlns:a14="http://schemas.microsoft.com/office/drawing/2010/main">
                 <a:solidFill>
                   <a:srgbClr val="FFFFFF"/>
@@ -11504,14 +11503,14 @@
           <a:noFill/>
           <a:ln/>
           <a:extLst>
-            <a:ext uri="{909E8E84-426E-40DD-AFC4-6F175D3DCCD1}">
+            <a:ext uri="{909E8E84-426E-40dd-AFC4-6F175D3DCCD1}">
               <a14:hiddenFill xmlns:a14="http://schemas.microsoft.com/office/drawing/2010/main">
                 <a:solidFill>
                   <a:srgbClr val="FFFFFF"/>
                 </a:solidFill>
               </a14:hiddenFill>
             </a:ext>
-            <a:ext uri="{91240B29-F687-4F45-9708-019B960494DF}">
+            <a:ext uri="{91240B29-F687-4f45-9708-019B960494DF}">
               <a14:hiddenLine xmlns:a14="http://schemas.microsoft.com/office/drawing/2010/main" w="9525">
                 <a:solidFill>
                   <a:srgbClr val="000000"/>
@@ -11650,7 +11649,7 @@
   <p:timing>
     <p:tnLst>
       <p:par>
-        <p:cTn id="1" dur="indefinite" restart="never" nodeType="tmRoot"/>
+        <p:cTn xmlns:p14="http://schemas.microsoft.com/office/powerpoint/2010/main" id="1" dur="indefinite" restart="never" nodeType="tmRoot"/>
       </p:par>
     </p:tnLst>
   </p:timing>
@@ -11688,14 +11687,14 @@
           <a:noFill/>
           <a:ln/>
           <a:extLst>
-            <a:ext uri="{909E8E84-426E-40DD-AFC4-6F175D3DCCD1}">
+            <a:ext uri="{909E8E84-426E-40dd-AFC4-6F175D3DCCD1}">
               <a14:hiddenFill xmlns:a14="http://schemas.microsoft.com/office/drawing/2010/main">
                 <a:solidFill>
                   <a:srgbClr val="FFFFFF"/>
                 </a:solidFill>
               </a14:hiddenFill>
             </a:ext>
-            <a:ext uri="{91240B29-F687-4F45-9708-019B960494DF}">
+            <a:ext uri="{91240B29-F687-4f45-9708-019B960494DF}">
               <a14:hiddenLine xmlns:a14="http://schemas.microsoft.com/office/drawing/2010/main" w="9525">
                 <a:solidFill>
                   <a:srgbClr val="000000"/>
@@ -11889,14 +11888,14 @@
             <a:noFill/>
           </a:ln>
           <a:extLst>
-            <a:ext uri="{909E8E84-426E-40DD-AFC4-6F175D3DCCD1}">
+            <a:ext uri="{909E8E84-426E-40dd-AFC4-6F175D3DCCD1}">
               <a14:hiddenFill xmlns:a14="http://schemas.microsoft.com/office/drawing/2010/main">
                 <a:solidFill>
                   <a:srgbClr val="FFFFFF"/>
                 </a:solidFill>
               </a14:hiddenFill>
             </a:ext>
-            <a:ext uri="{91240B29-F687-4F45-9708-019B960494DF}">
+            <a:ext uri="{91240B29-F687-4f45-9708-019B960494DF}">
               <a14:hiddenLine xmlns:a14="http://schemas.microsoft.com/office/drawing/2010/main" w="9525">
                 <a:solidFill>
                   <a:srgbClr val="000000"/>
@@ -12278,14 +12277,14 @@
             <a:noFill/>
           </a:ln>
           <a:extLst>
-            <a:ext uri="{909E8E84-426E-40DD-AFC4-6F175D3DCCD1}">
+            <a:ext uri="{909E8E84-426E-40dd-AFC4-6F175D3DCCD1}">
               <a14:hiddenFill xmlns:a14="http://schemas.microsoft.com/office/drawing/2010/main">
                 <a:solidFill>
                   <a:srgbClr val="FFFFFF"/>
                 </a:solidFill>
               </a14:hiddenFill>
             </a:ext>
-            <a:ext uri="{91240B29-F687-4F45-9708-019B960494DF}">
+            <a:ext uri="{91240B29-F687-4f45-9708-019B960494DF}">
               <a14:hiddenLine xmlns:a14="http://schemas.microsoft.com/office/drawing/2010/main" w="12700">
                 <a:solidFill>
                   <a:srgbClr val="000000"/>
@@ -12439,14 +12438,14 @@
             <a:noFill/>
           </a:ln>
           <a:extLst>
-            <a:ext uri="{909E8E84-426E-40DD-AFC4-6F175D3DCCD1}">
+            <a:ext uri="{909E8E84-426E-40dd-AFC4-6F175D3DCCD1}">
               <a14:hiddenFill xmlns:a14="http://schemas.microsoft.com/office/drawing/2010/main">
                 <a:solidFill>
                   <a:srgbClr val="FFFFFF"/>
                 </a:solidFill>
               </a14:hiddenFill>
             </a:ext>
-            <a:ext uri="{91240B29-F687-4F45-9708-019B960494DF}">
+            <a:ext uri="{91240B29-F687-4f45-9708-019B960494DF}">
               <a14:hiddenLine xmlns:a14="http://schemas.microsoft.com/office/drawing/2010/main" w="12700">
                 <a:solidFill>
                   <a:srgbClr val="000000"/>
@@ -12600,14 +12599,14 @@
             <a:noFill/>
           </a:ln>
           <a:extLst>
-            <a:ext uri="{909E8E84-426E-40DD-AFC4-6F175D3DCCD1}">
+            <a:ext uri="{909E8E84-426E-40dd-AFC4-6F175D3DCCD1}">
               <a14:hiddenFill xmlns:a14="http://schemas.microsoft.com/office/drawing/2010/main">
                 <a:solidFill>
                   <a:srgbClr val="FFFFFF"/>
                 </a:solidFill>
               </a14:hiddenFill>
             </a:ext>
-            <a:ext uri="{91240B29-F687-4F45-9708-019B960494DF}">
+            <a:ext uri="{91240B29-F687-4f45-9708-019B960494DF}">
               <a14:hiddenLine xmlns:a14="http://schemas.microsoft.com/office/drawing/2010/main" w="12700">
                 <a:solidFill>
                   <a:srgbClr val="000000"/>
@@ -12761,14 +12760,14 @@
             <a:noFill/>
           </a:ln>
           <a:extLst>
-            <a:ext uri="{909E8E84-426E-40DD-AFC4-6F175D3DCCD1}">
+            <a:ext uri="{909E8E84-426E-40dd-AFC4-6F175D3DCCD1}">
               <a14:hiddenFill xmlns:a14="http://schemas.microsoft.com/office/drawing/2010/main">
                 <a:solidFill>
                   <a:srgbClr val="FFFFFF"/>
                 </a:solidFill>
               </a14:hiddenFill>
             </a:ext>
-            <a:ext uri="{91240B29-F687-4F45-9708-019B960494DF}">
+            <a:ext uri="{91240B29-F687-4f45-9708-019B960494DF}">
               <a14:hiddenLine xmlns:a14="http://schemas.microsoft.com/office/drawing/2010/main" w="12700">
                 <a:solidFill>
                   <a:srgbClr val="000000"/>
@@ -12922,14 +12921,14 @@
             <a:noFill/>
           </a:ln>
           <a:extLst>
-            <a:ext uri="{909E8E84-426E-40DD-AFC4-6F175D3DCCD1}">
+            <a:ext uri="{909E8E84-426E-40dd-AFC4-6F175D3DCCD1}">
               <a14:hiddenFill xmlns:a14="http://schemas.microsoft.com/office/drawing/2010/main">
                 <a:solidFill>
                   <a:srgbClr val="FFFFFF"/>
                 </a:solidFill>
               </a14:hiddenFill>
             </a:ext>
-            <a:ext uri="{91240B29-F687-4F45-9708-019B960494DF}">
+            <a:ext uri="{91240B29-F687-4f45-9708-019B960494DF}">
               <a14:hiddenLine xmlns:a14="http://schemas.microsoft.com/office/drawing/2010/main" w="12700">
                 <a:solidFill>
                   <a:srgbClr val="000000"/>
@@ -13083,14 +13082,14 @@
             <a:noFill/>
           </a:ln>
           <a:extLst>
-            <a:ext uri="{909E8E84-426E-40DD-AFC4-6F175D3DCCD1}">
+            <a:ext uri="{909E8E84-426E-40dd-AFC4-6F175D3DCCD1}">
               <a14:hiddenFill xmlns:a14="http://schemas.microsoft.com/office/drawing/2010/main">
                 <a:solidFill>
                   <a:srgbClr val="FFFFFF"/>
                 </a:solidFill>
               </a14:hiddenFill>
             </a:ext>
-            <a:ext uri="{91240B29-F687-4F45-9708-019B960494DF}">
+            <a:ext uri="{91240B29-F687-4f45-9708-019B960494DF}">
               <a14:hiddenLine xmlns:a14="http://schemas.microsoft.com/office/drawing/2010/main" w="12700">
                 <a:solidFill>
                   <a:srgbClr val="000000"/>
@@ -13244,14 +13243,14 @@
             <a:noFill/>
           </a:ln>
           <a:extLst>
-            <a:ext uri="{909E8E84-426E-40DD-AFC4-6F175D3DCCD1}">
+            <a:ext uri="{909E8E84-426E-40dd-AFC4-6F175D3DCCD1}">
               <a14:hiddenFill xmlns:a14="http://schemas.microsoft.com/office/drawing/2010/main">
                 <a:solidFill>
                   <a:srgbClr val="FFFFFF"/>
                 </a:solidFill>
               </a14:hiddenFill>
             </a:ext>
-            <a:ext uri="{91240B29-F687-4F45-9708-019B960494DF}">
+            <a:ext uri="{91240B29-F687-4f45-9708-019B960494DF}">
               <a14:hiddenLine xmlns:a14="http://schemas.microsoft.com/office/drawing/2010/main" w="12700">
                 <a:solidFill>
                   <a:srgbClr val="000000"/>
@@ -13405,14 +13404,14 @@
             <a:noFill/>
           </a:ln>
           <a:extLst>
-            <a:ext uri="{909E8E84-426E-40DD-AFC4-6F175D3DCCD1}">
+            <a:ext uri="{909E8E84-426E-40dd-AFC4-6F175D3DCCD1}">
               <a14:hiddenFill xmlns:a14="http://schemas.microsoft.com/office/drawing/2010/main">
                 <a:solidFill>
                   <a:srgbClr val="FFFFFF"/>
                 </a:solidFill>
               </a14:hiddenFill>
             </a:ext>
-            <a:ext uri="{91240B29-F687-4F45-9708-019B960494DF}">
+            <a:ext uri="{91240B29-F687-4f45-9708-019B960494DF}">
               <a14:hiddenLine xmlns:a14="http://schemas.microsoft.com/office/drawing/2010/main" w="12700">
                 <a:solidFill>
                   <a:srgbClr val="000000"/>
@@ -13566,14 +13565,14 @@
             <a:noFill/>
           </a:ln>
           <a:extLst>
-            <a:ext uri="{909E8E84-426E-40DD-AFC4-6F175D3DCCD1}">
+            <a:ext uri="{909E8E84-426E-40dd-AFC4-6F175D3DCCD1}">
               <a14:hiddenFill xmlns:a14="http://schemas.microsoft.com/office/drawing/2010/main">
                 <a:solidFill>
                   <a:srgbClr val="FFFFFF"/>
                 </a:solidFill>
               </a14:hiddenFill>
             </a:ext>
-            <a:ext uri="{91240B29-F687-4F45-9708-019B960494DF}">
+            <a:ext uri="{91240B29-F687-4f45-9708-019B960494DF}">
               <a14:hiddenLine xmlns:a14="http://schemas.microsoft.com/office/drawing/2010/main" w="12700">
                 <a:solidFill>
                   <a:srgbClr val="000000"/>
@@ -13727,14 +13726,14 @@
             <a:noFill/>
           </a:ln>
           <a:extLst>
-            <a:ext uri="{909E8E84-426E-40DD-AFC4-6F175D3DCCD1}">
+            <a:ext uri="{909E8E84-426E-40dd-AFC4-6F175D3DCCD1}">
               <a14:hiddenFill xmlns:a14="http://schemas.microsoft.com/office/drawing/2010/main">
                 <a:solidFill>
                   <a:srgbClr val="FFFFFF"/>
                 </a:solidFill>
               </a14:hiddenFill>
             </a:ext>
-            <a:ext uri="{91240B29-F687-4F45-9708-019B960494DF}">
+            <a:ext uri="{91240B29-F687-4f45-9708-019B960494DF}">
               <a14:hiddenLine xmlns:a14="http://schemas.microsoft.com/office/drawing/2010/main" w="12700">
                 <a:solidFill>
                   <a:srgbClr val="000000"/>
@@ -13888,14 +13887,14 @@
             <a:noFill/>
           </a:ln>
           <a:extLst>
-            <a:ext uri="{909E8E84-426E-40DD-AFC4-6F175D3DCCD1}">
+            <a:ext uri="{909E8E84-426E-40dd-AFC4-6F175D3DCCD1}">
               <a14:hiddenFill xmlns:a14="http://schemas.microsoft.com/office/drawing/2010/main">
                 <a:solidFill>
                   <a:srgbClr val="FFFFFF"/>
                 </a:solidFill>
               </a14:hiddenFill>
             </a:ext>
-            <a:ext uri="{91240B29-F687-4F45-9708-019B960494DF}">
+            <a:ext uri="{91240B29-F687-4f45-9708-019B960494DF}">
               <a14:hiddenLine xmlns:a14="http://schemas.microsoft.com/office/drawing/2010/main" w="12700">
                 <a:solidFill>
                   <a:srgbClr val="000000"/>
@@ -14049,14 +14048,14 @@
             <a:noFill/>
           </a:ln>
           <a:extLst>
-            <a:ext uri="{909E8E84-426E-40DD-AFC4-6F175D3DCCD1}">
+            <a:ext uri="{909E8E84-426E-40dd-AFC4-6F175D3DCCD1}">
               <a14:hiddenFill xmlns:a14="http://schemas.microsoft.com/office/drawing/2010/main">
                 <a:solidFill>
                   <a:srgbClr val="FFFFFF"/>
                 </a:solidFill>
               </a14:hiddenFill>
             </a:ext>
-            <a:ext uri="{91240B29-F687-4F45-9708-019B960494DF}">
+            <a:ext uri="{91240B29-F687-4f45-9708-019B960494DF}">
               <a14:hiddenLine xmlns:a14="http://schemas.microsoft.com/office/drawing/2010/main" w="12700">
                 <a:solidFill>
                   <a:srgbClr val="000000"/>
@@ -14210,14 +14209,14 @@
             <a:noFill/>
           </a:ln>
           <a:extLst>
-            <a:ext uri="{909E8E84-426E-40DD-AFC4-6F175D3DCCD1}">
+            <a:ext uri="{909E8E84-426E-40dd-AFC4-6F175D3DCCD1}">
               <a14:hiddenFill xmlns:a14="http://schemas.microsoft.com/office/drawing/2010/main">
                 <a:solidFill>
                   <a:srgbClr val="FFFFFF"/>
                 </a:solidFill>
               </a14:hiddenFill>
             </a:ext>
-            <a:ext uri="{91240B29-F687-4F45-9708-019B960494DF}">
+            <a:ext uri="{91240B29-F687-4f45-9708-019B960494DF}">
               <a14:hiddenLine xmlns:a14="http://schemas.microsoft.com/office/drawing/2010/main" w="12700">
                 <a:solidFill>
                   <a:srgbClr val="000000"/>
@@ -14371,14 +14370,14 @@
             <a:noFill/>
           </a:ln>
           <a:extLst>
-            <a:ext uri="{909E8E84-426E-40DD-AFC4-6F175D3DCCD1}">
+            <a:ext uri="{909E8E84-426E-40dd-AFC4-6F175D3DCCD1}">
               <a14:hiddenFill xmlns:a14="http://schemas.microsoft.com/office/drawing/2010/main">
                 <a:solidFill>
                   <a:srgbClr val="FFFFFF"/>
                 </a:solidFill>
               </a14:hiddenFill>
             </a:ext>
-            <a:ext uri="{91240B29-F687-4F45-9708-019B960494DF}">
+            <a:ext uri="{91240B29-F687-4f45-9708-019B960494DF}">
               <a14:hiddenLine xmlns:a14="http://schemas.microsoft.com/office/drawing/2010/main" w="12700">
                 <a:solidFill>
                   <a:srgbClr val="000000"/>
@@ -14532,14 +14531,14 @@
             <a:noFill/>
           </a:ln>
           <a:extLst>
-            <a:ext uri="{909E8E84-426E-40DD-AFC4-6F175D3DCCD1}">
+            <a:ext uri="{909E8E84-426E-40dd-AFC4-6F175D3DCCD1}">
               <a14:hiddenFill xmlns:a14="http://schemas.microsoft.com/office/drawing/2010/main">
                 <a:solidFill>
                   <a:srgbClr val="FFFFFF"/>
                 </a:solidFill>
               </a14:hiddenFill>
             </a:ext>
-            <a:ext uri="{91240B29-F687-4F45-9708-019B960494DF}">
+            <a:ext uri="{91240B29-F687-4f45-9708-019B960494DF}">
               <a14:hiddenLine xmlns:a14="http://schemas.microsoft.com/office/drawing/2010/main" w="12700">
                 <a:solidFill>
                   <a:srgbClr val="000000"/>
@@ -14696,14 +14695,14 @@
             <a:noFill/>
           </a:ln>
           <a:extLst>
-            <a:ext uri="{909E8E84-426E-40DD-AFC4-6F175D3DCCD1}">
+            <a:ext uri="{909E8E84-426E-40dd-AFC4-6F175D3DCCD1}">
               <a14:hiddenFill xmlns:a14="http://schemas.microsoft.com/office/drawing/2010/main">
                 <a:solidFill>
                   <a:srgbClr val="FFFFFF"/>
                 </a:solidFill>
               </a14:hiddenFill>
             </a:ext>
-            <a:ext uri="{91240B29-F687-4F45-9708-019B960494DF}">
+            <a:ext uri="{91240B29-F687-4f45-9708-019B960494DF}">
               <a14:hiddenLine xmlns:a14="http://schemas.microsoft.com/office/drawing/2010/main" w="12700">
                 <a:solidFill>
                   <a:srgbClr val="000000"/>
@@ -14857,14 +14856,14 @@
             <a:noFill/>
           </a:ln>
           <a:extLst>
-            <a:ext uri="{909E8E84-426E-40DD-AFC4-6F175D3DCCD1}">
+            <a:ext uri="{909E8E84-426E-40dd-AFC4-6F175D3DCCD1}">
               <a14:hiddenFill xmlns:a14="http://schemas.microsoft.com/office/drawing/2010/main">
                 <a:solidFill>
                   <a:srgbClr val="FFFFFF"/>
                 </a:solidFill>
               </a14:hiddenFill>
             </a:ext>
-            <a:ext uri="{91240B29-F687-4F45-9708-019B960494DF}">
+            <a:ext uri="{91240B29-F687-4f45-9708-019B960494DF}">
               <a14:hiddenLine xmlns:a14="http://schemas.microsoft.com/office/drawing/2010/main" w="12700">
                 <a:solidFill>
                   <a:srgbClr val="000000"/>
@@ -15018,14 +15017,14 @@
             <a:noFill/>
           </a:ln>
           <a:extLst>
-            <a:ext uri="{909E8E84-426E-40DD-AFC4-6F175D3DCCD1}">
+            <a:ext uri="{909E8E84-426E-40dd-AFC4-6F175D3DCCD1}">
               <a14:hiddenFill xmlns:a14="http://schemas.microsoft.com/office/drawing/2010/main">
                 <a:solidFill>
                   <a:srgbClr val="FFFFFF"/>
                 </a:solidFill>
               </a14:hiddenFill>
             </a:ext>
-            <a:ext uri="{91240B29-F687-4F45-9708-019B960494DF}">
+            <a:ext uri="{91240B29-F687-4f45-9708-019B960494DF}">
               <a14:hiddenLine xmlns:a14="http://schemas.microsoft.com/office/drawing/2010/main" w="12700">
                 <a:solidFill>
                   <a:srgbClr val="000000"/>
@@ -15179,14 +15178,14 @@
             <a:noFill/>
           </a:ln>
           <a:extLst>
-            <a:ext uri="{909E8E84-426E-40DD-AFC4-6F175D3DCCD1}">
+            <a:ext uri="{909E8E84-426E-40dd-AFC4-6F175D3DCCD1}">
               <a14:hiddenFill xmlns:a14="http://schemas.microsoft.com/office/drawing/2010/main">
                 <a:solidFill>
                   <a:srgbClr val="FFFFFF"/>
                 </a:solidFill>
               </a14:hiddenFill>
             </a:ext>
-            <a:ext uri="{91240B29-F687-4F45-9708-019B960494DF}">
+            <a:ext uri="{91240B29-F687-4f45-9708-019B960494DF}">
               <a14:hiddenLine xmlns:a14="http://schemas.microsoft.com/office/drawing/2010/main" w="12700">
                 <a:solidFill>
                   <a:srgbClr val="000000"/>
@@ -15340,14 +15339,14 @@
             <a:noFill/>
           </a:ln>
           <a:extLst>
-            <a:ext uri="{909E8E84-426E-40DD-AFC4-6F175D3DCCD1}">
+            <a:ext uri="{909E8E84-426E-40dd-AFC4-6F175D3DCCD1}">
               <a14:hiddenFill xmlns:a14="http://schemas.microsoft.com/office/drawing/2010/main">
                 <a:solidFill>
                   <a:srgbClr val="FFFFFF"/>
                 </a:solidFill>
               </a14:hiddenFill>
             </a:ext>
-            <a:ext uri="{91240B29-F687-4F45-9708-019B960494DF}">
+            <a:ext uri="{91240B29-F687-4f45-9708-019B960494DF}">
               <a14:hiddenLine xmlns:a14="http://schemas.microsoft.com/office/drawing/2010/main" w="12700">
                 <a:solidFill>
                   <a:srgbClr val="000000"/>
@@ -15501,14 +15500,14 @@
             <a:noFill/>
           </a:ln>
           <a:extLst>
-            <a:ext uri="{909E8E84-426E-40DD-AFC4-6F175D3DCCD1}">
+            <a:ext uri="{909E8E84-426E-40dd-AFC4-6F175D3DCCD1}">
               <a14:hiddenFill xmlns:a14="http://schemas.microsoft.com/office/drawing/2010/main">
                 <a:solidFill>
                   <a:srgbClr val="FFFFFF"/>
                 </a:solidFill>
               </a14:hiddenFill>
             </a:ext>
-            <a:ext uri="{91240B29-F687-4F45-9708-019B960494DF}">
+            <a:ext uri="{91240B29-F687-4f45-9708-019B960494DF}">
               <a14:hiddenLine xmlns:a14="http://schemas.microsoft.com/office/drawing/2010/main" w="12700">
                 <a:solidFill>
                   <a:srgbClr val="000000"/>
@@ -15662,14 +15661,14 @@
             <a:noFill/>
           </a:ln>
           <a:extLst>
-            <a:ext uri="{909E8E84-426E-40DD-AFC4-6F175D3DCCD1}">
+            <a:ext uri="{909E8E84-426E-40dd-AFC4-6F175D3DCCD1}">
               <a14:hiddenFill xmlns:a14="http://schemas.microsoft.com/office/drawing/2010/main">
                 <a:solidFill>
                   <a:srgbClr val="FFFFFF"/>
                 </a:solidFill>
               </a14:hiddenFill>
             </a:ext>
-            <a:ext uri="{91240B29-F687-4F45-9708-019B960494DF}">
+            <a:ext uri="{91240B29-F687-4f45-9708-019B960494DF}">
               <a14:hiddenLine xmlns:a14="http://schemas.microsoft.com/office/drawing/2010/main" w="12700">
                 <a:solidFill>
                   <a:srgbClr val="000000"/>
@@ -15823,14 +15822,14 @@
             <a:noFill/>
           </a:ln>
           <a:extLst>
-            <a:ext uri="{909E8E84-426E-40DD-AFC4-6F175D3DCCD1}">
+            <a:ext uri="{909E8E84-426E-40dd-AFC4-6F175D3DCCD1}">
               <a14:hiddenFill xmlns:a14="http://schemas.microsoft.com/office/drawing/2010/main">
                 <a:solidFill>
                   <a:srgbClr val="FFFFFF"/>
                 </a:solidFill>
               </a14:hiddenFill>
             </a:ext>
-            <a:ext uri="{91240B29-F687-4F45-9708-019B960494DF}">
+            <a:ext uri="{91240B29-F687-4f45-9708-019B960494DF}">
               <a14:hiddenLine xmlns:a14="http://schemas.microsoft.com/office/drawing/2010/main" w="12700">
                 <a:solidFill>
                   <a:srgbClr val="000000"/>
@@ -15984,14 +15983,14 @@
             <a:noFill/>
           </a:ln>
           <a:extLst>
-            <a:ext uri="{909E8E84-426E-40DD-AFC4-6F175D3DCCD1}">
+            <a:ext uri="{909E8E84-426E-40dd-AFC4-6F175D3DCCD1}">
               <a14:hiddenFill xmlns:a14="http://schemas.microsoft.com/office/drawing/2010/main">
                 <a:solidFill>
                   <a:srgbClr val="FFFFFF"/>
                 </a:solidFill>
               </a14:hiddenFill>
             </a:ext>
-            <a:ext uri="{91240B29-F687-4F45-9708-019B960494DF}">
+            <a:ext uri="{91240B29-F687-4f45-9708-019B960494DF}">
               <a14:hiddenLine xmlns:a14="http://schemas.microsoft.com/office/drawing/2010/main" w="12700">
                 <a:solidFill>
                   <a:srgbClr val="000000"/>
@@ -16145,14 +16144,14 @@
             <a:noFill/>
           </a:ln>
           <a:extLst>
-            <a:ext uri="{909E8E84-426E-40DD-AFC4-6F175D3DCCD1}">
+            <a:ext uri="{909E8E84-426E-40dd-AFC4-6F175D3DCCD1}">
               <a14:hiddenFill xmlns:a14="http://schemas.microsoft.com/office/drawing/2010/main">
                 <a:solidFill>
                   <a:srgbClr val="FFFFFF"/>
                 </a:solidFill>
               </a14:hiddenFill>
             </a:ext>
-            <a:ext uri="{91240B29-F687-4F45-9708-019B960494DF}">
+            <a:ext uri="{91240B29-F687-4f45-9708-019B960494DF}">
               <a14:hiddenLine xmlns:a14="http://schemas.microsoft.com/office/drawing/2010/main" w="12700">
                 <a:solidFill>
                   <a:srgbClr val="000000"/>
@@ -16306,14 +16305,14 @@
             <a:noFill/>
           </a:ln>
           <a:extLst>
-            <a:ext uri="{909E8E84-426E-40DD-AFC4-6F175D3DCCD1}">
+            <a:ext uri="{909E8E84-426E-40dd-AFC4-6F175D3DCCD1}">
               <a14:hiddenFill xmlns:a14="http://schemas.microsoft.com/office/drawing/2010/main">
                 <a:solidFill>
                   <a:srgbClr val="FFFFFF"/>
                 </a:solidFill>
               </a14:hiddenFill>
             </a:ext>
-            <a:ext uri="{91240B29-F687-4F45-9708-019B960494DF}">
+            <a:ext uri="{91240B29-F687-4f45-9708-019B960494DF}">
               <a14:hiddenLine xmlns:a14="http://schemas.microsoft.com/office/drawing/2010/main" w="12700">
                 <a:solidFill>
                   <a:srgbClr val="000000"/>
@@ -16467,14 +16466,14 @@
             <a:noFill/>
           </a:ln>
           <a:extLst>
-            <a:ext uri="{909E8E84-426E-40DD-AFC4-6F175D3DCCD1}">
+            <a:ext uri="{909E8E84-426E-40dd-AFC4-6F175D3DCCD1}">
               <a14:hiddenFill xmlns:a14="http://schemas.microsoft.com/office/drawing/2010/main">
                 <a:solidFill>
                   <a:srgbClr val="FFFFFF"/>
                 </a:solidFill>
               </a14:hiddenFill>
             </a:ext>
-            <a:ext uri="{91240B29-F687-4F45-9708-019B960494DF}">
+            <a:ext uri="{91240B29-F687-4f45-9708-019B960494DF}">
               <a14:hiddenLine xmlns:a14="http://schemas.microsoft.com/office/drawing/2010/main" w="12700">
                 <a:solidFill>
                   <a:srgbClr val="000000"/>
@@ -16628,14 +16627,14 @@
             <a:noFill/>
           </a:ln>
           <a:extLst>
-            <a:ext uri="{909E8E84-426E-40DD-AFC4-6F175D3DCCD1}">
+            <a:ext uri="{909E8E84-426E-40dd-AFC4-6F175D3DCCD1}">
               <a14:hiddenFill xmlns:a14="http://schemas.microsoft.com/office/drawing/2010/main">
                 <a:solidFill>
                   <a:srgbClr val="FFFFFF"/>
                 </a:solidFill>
               </a14:hiddenFill>
             </a:ext>
-            <a:ext uri="{91240B29-F687-4F45-9708-019B960494DF}">
+            <a:ext uri="{91240B29-F687-4f45-9708-019B960494DF}">
               <a14:hiddenLine xmlns:a14="http://schemas.microsoft.com/office/drawing/2010/main" w="12700">
                 <a:solidFill>
                   <a:srgbClr val="000000"/>
@@ -16789,14 +16788,14 @@
             <a:noFill/>
           </a:ln>
           <a:extLst>
-            <a:ext uri="{909E8E84-426E-40DD-AFC4-6F175D3DCCD1}">
+            <a:ext uri="{909E8E84-426E-40dd-AFC4-6F175D3DCCD1}">
               <a14:hiddenFill xmlns:a14="http://schemas.microsoft.com/office/drawing/2010/main">
                 <a:solidFill>
                   <a:srgbClr val="FFFFFF"/>
                 </a:solidFill>
               </a14:hiddenFill>
             </a:ext>
-            <a:ext uri="{91240B29-F687-4F45-9708-019B960494DF}">
+            <a:ext uri="{91240B29-F687-4f45-9708-019B960494DF}">
               <a14:hiddenLine xmlns:a14="http://schemas.microsoft.com/office/drawing/2010/main" w="12700">
                 <a:solidFill>
                   <a:srgbClr val="000000"/>
@@ -16953,14 +16952,14 @@
             <a:noFill/>
           </a:ln>
           <a:extLst>
-            <a:ext uri="{909E8E84-426E-40DD-AFC4-6F175D3DCCD1}">
+            <a:ext uri="{909E8E84-426E-40dd-AFC4-6F175D3DCCD1}">
               <a14:hiddenFill xmlns:a14="http://schemas.microsoft.com/office/drawing/2010/main">
                 <a:solidFill>
                   <a:srgbClr val="FFFFFF"/>
                 </a:solidFill>
               </a14:hiddenFill>
             </a:ext>
-            <a:ext uri="{91240B29-F687-4F45-9708-019B960494DF}">
+            <a:ext uri="{91240B29-F687-4f45-9708-019B960494DF}">
               <a14:hiddenLine xmlns:a14="http://schemas.microsoft.com/office/drawing/2010/main" w="12700">
                 <a:solidFill>
                   <a:srgbClr val="000000"/>
@@ -17117,14 +17116,14 @@
             <a:noFill/>
           </a:ln>
           <a:extLst>
-            <a:ext uri="{909E8E84-426E-40DD-AFC4-6F175D3DCCD1}">
+            <a:ext uri="{909E8E84-426E-40dd-AFC4-6F175D3DCCD1}">
               <a14:hiddenFill xmlns:a14="http://schemas.microsoft.com/office/drawing/2010/main">
                 <a:solidFill>
                   <a:srgbClr val="FFFFFF"/>
                 </a:solidFill>
               </a14:hiddenFill>
             </a:ext>
-            <a:ext uri="{91240B29-F687-4F45-9708-019B960494DF}">
+            <a:ext uri="{91240B29-F687-4f45-9708-019B960494DF}">
               <a14:hiddenLine xmlns:a14="http://schemas.microsoft.com/office/drawing/2010/main" w="12700">
                 <a:solidFill>
                   <a:srgbClr val="000000"/>
@@ -17281,14 +17280,14 @@
             <a:noFill/>
           </a:ln>
           <a:extLst>
-            <a:ext uri="{909E8E84-426E-40DD-AFC4-6F175D3DCCD1}">
+            <a:ext uri="{909E8E84-426E-40dd-AFC4-6F175D3DCCD1}">
               <a14:hiddenFill xmlns:a14="http://schemas.microsoft.com/office/drawing/2010/main">
                 <a:solidFill>
                   <a:srgbClr val="FFFFFF"/>
                 </a:solidFill>
               </a14:hiddenFill>
             </a:ext>
-            <a:ext uri="{91240B29-F687-4F45-9708-019B960494DF}">
+            <a:ext uri="{91240B29-F687-4f45-9708-019B960494DF}">
               <a14:hiddenLine xmlns:a14="http://schemas.microsoft.com/office/drawing/2010/main" w="12700">
                 <a:solidFill>
                   <a:srgbClr val="000000"/>
@@ -17445,14 +17444,14 @@
             <a:noFill/>
           </a:ln>
           <a:extLst>
-            <a:ext uri="{909E8E84-426E-40DD-AFC4-6F175D3DCCD1}">
+            <a:ext uri="{909E8E84-426E-40dd-AFC4-6F175D3DCCD1}">
               <a14:hiddenFill xmlns:a14="http://schemas.microsoft.com/office/drawing/2010/main">
                 <a:solidFill>
                   <a:srgbClr val="FFFFFF"/>
                 </a:solidFill>
               </a14:hiddenFill>
             </a:ext>
-            <a:ext uri="{91240B29-F687-4F45-9708-019B960494DF}">
+            <a:ext uri="{91240B29-F687-4f45-9708-019B960494DF}">
               <a14:hiddenLine xmlns:a14="http://schemas.microsoft.com/office/drawing/2010/main" w="12700">
                 <a:solidFill>
                   <a:srgbClr val="000000"/>
@@ -17606,14 +17605,14 @@
             <a:noFill/>
           </a:ln>
           <a:extLst>
-            <a:ext uri="{909E8E84-426E-40DD-AFC4-6F175D3DCCD1}">
+            <a:ext uri="{909E8E84-426E-40dd-AFC4-6F175D3DCCD1}">
               <a14:hiddenFill xmlns:a14="http://schemas.microsoft.com/office/drawing/2010/main">
                 <a:solidFill>
                   <a:srgbClr val="FFFFFF"/>
                 </a:solidFill>
               </a14:hiddenFill>
             </a:ext>
-            <a:ext uri="{91240B29-F687-4F45-9708-019B960494DF}">
+            <a:ext uri="{91240B29-F687-4f45-9708-019B960494DF}">
               <a14:hiddenLine xmlns:a14="http://schemas.microsoft.com/office/drawing/2010/main" w="12700">
                 <a:solidFill>
                   <a:srgbClr val="000000"/>
@@ -17767,14 +17766,14 @@
             <a:noFill/>
           </a:ln>
           <a:extLst>
-            <a:ext uri="{909E8E84-426E-40DD-AFC4-6F175D3DCCD1}">
+            <a:ext uri="{909E8E84-426E-40dd-AFC4-6F175D3DCCD1}">
               <a14:hiddenFill xmlns:a14="http://schemas.microsoft.com/office/drawing/2010/main">
                 <a:solidFill>
                   <a:srgbClr val="FFFFFF"/>
                 </a:solidFill>
               </a14:hiddenFill>
             </a:ext>
-            <a:ext uri="{91240B29-F687-4F45-9708-019B960494DF}">
+            <a:ext uri="{91240B29-F687-4f45-9708-019B960494DF}">
               <a14:hiddenLine xmlns:a14="http://schemas.microsoft.com/office/drawing/2010/main" w="12700">
                 <a:solidFill>
                   <a:srgbClr val="000000"/>
@@ -17931,14 +17930,14 @@
             <a:noFill/>
           </a:ln>
           <a:extLst>
-            <a:ext uri="{909E8E84-426E-40DD-AFC4-6F175D3DCCD1}">
+            <a:ext uri="{909E8E84-426E-40dd-AFC4-6F175D3DCCD1}">
               <a14:hiddenFill xmlns:a14="http://schemas.microsoft.com/office/drawing/2010/main">
                 <a:solidFill>
                   <a:srgbClr val="FFFFFF"/>
                 </a:solidFill>
               </a14:hiddenFill>
             </a:ext>
-            <a:ext uri="{91240B29-F687-4F45-9708-019B960494DF}">
+            <a:ext uri="{91240B29-F687-4f45-9708-019B960494DF}">
               <a14:hiddenLine xmlns:a14="http://schemas.microsoft.com/office/drawing/2010/main" w="12700">
                 <a:solidFill>
                   <a:srgbClr val="000000"/>
@@ -18095,14 +18094,14 @@
             <a:noFill/>
           </a:ln>
           <a:extLst>
-            <a:ext uri="{909E8E84-426E-40DD-AFC4-6F175D3DCCD1}">
+            <a:ext uri="{909E8E84-426E-40dd-AFC4-6F175D3DCCD1}">
               <a14:hiddenFill xmlns:a14="http://schemas.microsoft.com/office/drawing/2010/main">
                 <a:solidFill>
                   <a:srgbClr val="FFFFFF"/>
                 </a:solidFill>
               </a14:hiddenFill>
             </a:ext>
-            <a:ext uri="{91240B29-F687-4F45-9708-019B960494DF}">
+            <a:ext uri="{91240B29-F687-4f45-9708-019B960494DF}">
               <a14:hiddenLine xmlns:a14="http://schemas.microsoft.com/office/drawing/2010/main" w="12700">
                 <a:solidFill>
                   <a:srgbClr val="000000"/>
@@ -18259,14 +18258,14 @@
             <a:noFill/>
           </a:ln>
           <a:extLst>
-            <a:ext uri="{909E8E84-426E-40DD-AFC4-6F175D3DCCD1}">
+            <a:ext uri="{909E8E84-426E-40dd-AFC4-6F175D3DCCD1}">
               <a14:hiddenFill xmlns:a14="http://schemas.microsoft.com/office/drawing/2010/main">
                 <a:solidFill>
                   <a:srgbClr val="FFFFFF"/>
                 </a:solidFill>
               </a14:hiddenFill>
             </a:ext>
-            <a:ext uri="{91240B29-F687-4F45-9708-019B960494DF}">
+            <a:ext uri="{91240B29-F687-4f45-9708-019B960494DF}">
               <a14:hiddenLine xmlns:a14="http://schemas.microsoft.com/office/drawing/2010/main" w="12700">
                 <a:solidFill>
                   <a:srgbClr val="000000"/>
@@ -18423,14 +18422,14 @@
             <a:noFill/>
           </a:ln>
           <a:extLst>
-            <a:ext uri="{909E8E84-426E-40DD-AFC4-6F175D3DCCD1}">
+            <a:ext uri="{909E8E84-426E-40dd-AFC4-6F175D3DCCD1}">
               <a14:hiddenFill xmlns:a14="http://schemas.microsoft.com/office/drawing/2010/main">
                 <a:solidFill>
                   <a:srgbClr val="FFFFFF"/>
                 </a:solidFill>
               </a14:hiddenFill>
             </a:ext>
-            <a:ext uri="{91240B29-F687-4F45-9708-019B960494DF}">
+            <a:ext uri="{91240B29-F687-4f45-9708-019B960494DF}">
               <a14:hiddenLine xmlns:a14="http://schemas.microsoft.com/office/drawing/2010/main" w="12700">
                 <a:solidFill>
                   <a:srgbClr val="000000"/>
@@ -18587,14 +18586,14 @@
             <a:noFill/>
           </a:ln>
           <a:extLst>
-            <a:ext uri="{909E8E84-426E-40DD-AFC4-6F175D3DCCD1}">
+            <a:ext uri="{909E8E84-426E-40dd-AFC4-6F175D3DCCD1}">
               <a14:hiddenFill xmlns:a14="http://schemas.microsoft.com/office/drawing/2010/main">
                 <a:solidFill>
                   <a:srgbClr val="FFFFFF"/>
                 </a:solidFill>
               </a14:hiddenFill>
             </a:ext>
-            <a:ext uri="{91240B29-F687-4F45-9708-019B960494DF}">
+            <a:ext uri="{91240B29-F687-4f45-9708-019B960494DF}">
               <a14:hiddenLine xmlns:a14="http://schemas.microsoft.com/office/drawing/2010/main" w="12700">
                 <a:solidFill>
                   <a:srgbClr val="000000"/>
@@ -18751,14 +18750,14 @@
             <a:noFill/>
           </a:ln>
           <a:extLst>
-            <a:ext uri="{909E8E84-426E-40DD-AFC4-6F175D3DCCD1}">
+            <a:ext uri="{909E8E84-426E-40dd-AFC4-6F175D3DCCD1}">
               <a14:hiddenFill xmlns:a14="http://schemas.microsoft.com/office/drawing/2010/main">
                 <a:solidFill>
                   <a:srgbClr val="FFFFFF"/>
                 </a:solidFill>
               </a14:hiddenFill>
             </a:ext>
-            <a:ext uri="{91240B29-F687-4F45-9708-019B960494DF}">
+            <a:ext uri="{91240B29-F687-4f45-9708-019B960494DF}">
               <a14:hiddenLine xmlns:a14="http://schemas.microsoft.com/office/drawing/2010/main" w="12700">
                 <a:solidFill>
                   <a:srgbClr val="000000"/>
@@ -18915,14 +18914,14 @@
             <a:noFill/>
           </a:ln>
           <a:extLst>
-            <a:ext uri="{909E8E84-426E-40DD-AFC4-6F175D3DCCD1}">
+            <a:ext uri="{909E8E84-426E-40dd-AFC4-6F175D3DCCD1}">
               <a14:hiddenFill xmlns:a14="http://schemas.microsoft.com/office/drawing/2010/main">
                 <a:solidFill>
                   <a:srgbClr val="FFFFFF"/>
                 </a:solidFill>
               </a14:hiddenFill>
             </a:ext>
-            <a:ext uri="{91240B29-F687-4F45-9708-019B960494DF}">
+            <a:ext uri="{91240B29-F687-4f45-9708-019B960494DF}">
               <a14:hiddenLine xmlns:a14="http://schemas.microsoft.com/office/drawing/2010/main" w="12700">
                 <a:solidFill>
                   <a:srgbClr val="000000"/>
@@ -19079,14 +19078,14 @@
             <a:noFill/>
           </a:ln>
           <a:extLst>
-            <a:ext uri="{909E8E84-426E-40DD-AFC4-6F175D3DCCD1}">
+            <a:ext uri="{909E8E84-426E-40dd-AFC4-6F175D3DCCD1}">
               <a14:hiddenFill xmlns:a14="http://schemas.microsoft.com/office/drawing/2010/main">
                 <a:solidFill>
                   <a:srgbClr val="FFFFFF"/>
                 </a:solidFill>
               </a14:hiddenFill>
             </a:ext>
-            <a:ext uri="{91240B29-F687-4F45-9708-019B960494DF}">
+            <a:ext uri="{91240B29-F687-4f45-9708-019B960494DF}">
               <a14:hiddenLine xmlns:a14="http://schemas.microsoft.com/office/drawing/2010/main" w="12700">
                 <a:solidFill>
                   <a:srgbClr val="000000"/>
@@ -19243,14 +19242,14 @@
             <a:noFill/>
           </a:ln>
           <a:extLst>
-            <a:ext uri="{909E8E84-426E-40DD-AFC4-6F175D3DCCD1}">
+            <a:ext uri="{909E8E84-426E-40dd-AFC4-6F175D3DCCD1}">
               <a14:hiddenFill xmlns:a14="http://schemas.microsoft.com/office/drawing/2010/main">
                 <a:solidFill>
                   <a:srgbClr val="FFFFFF"/>
                 </a:solidFill>
               </a14:hiddenFill>
             </a:ext>
-            <a:ext uri="{91240B29-F687-4F45-9708-019B960494DF}">
+            <a:ext uri="{91240B29-F687-4f45-9708-019B960494DF}">
               <a14:hiddenLine xmlns:a14="http://schemas.microsoft.com/office/drawing/2010/main" w="12700">
                 <a:solidFill>
                   <a:srgbClr val="000000"/>
@@ -19407,14 +19406,14 @@
             <a:noFill/>
           </a:ln>
           <a:extLst>
-            <a:ext uri="{909E8E84-426E-40DD-AFC4-6F175D3DCCD1}">
+            <a:ext uri="{909E8E84-426E-40dd-AFC4-6F175D3DCCD1}">
               <a14:hiddenFill xmlns:a14="http://schemas.microsoft.com/office/drawing/2010/main">
                 <a:solidFill>
                   <a:srgbClr val="FFFFFF"/>
                 </a:solidFill>
               </a14:hiddenFill>
             </a:ext>
-            <a:ext uri="{91240B29-F687-4F45-9708-019B960494DF}">
+            <a:ext uri="{91240B29-F687-4f45-9708-019B960494DF}">
               <a14:hiddenLine xmlns:a14="http://schemas.microsoft.com/office/drawing/2010/main" w="12700">
                 <a:solidFill>
                   <a:srgbClr val="000000"/>
@@ -19571,14 +19570,14 @@
             <a:noFill/>
           </a:ln>
           <a:extLst>
-            <a:ext uri="{909E8E84-426E-40DD-AFC4-6F175D3DCCD1}">
+            <a:ext uri="{909E8E84-426E-40dd-AFC4-6F175D3DCCD1}">
               <a14:hiddenFill xmlns:a14="http://schemas.microsoft.com/office/drawing/2010/main">
                 <a:solidFill>
                   <a:srgbClr val="FFFFFF"/>
                 </a:solidFill>
               </a14:hiddenFill>
             </a:ext>
-            <a:ext uri="{91240B29-F687-4F45-9708-019B960494DF}">
+            <a:ext uri="{91240B29-F687-4f45-9708-019B960494DF}">
               <a14:hiddenLine xmlns:a14="http://schemas.microsoft.com/office/drawing/2010/main" w="12700">
                 <a:solidFill>
                   <a:srgbClr val="000000"/>
@@ -19735,14 +19734,14 @@
             <a:noFill/>
           </a:ln>
           <a:extLst>
-            <a:ext uri="{909E8E84-426E-40DD-AFC4-6F175D3DCCD1}">
+            <a:ext uri="{909E8E84-426E-40dd-AFC4-6F175D3DCCD1}">
               <a14:hiddenFill xmlns:a14="http://schemas.microsoft.com/office/drawing/2010/main">
                 <a:solidFill>
                   <a:srgbClr val="FFFFFF"/>
                 </a:solidFill>
               </a14:hiddenFill>
             </a:ext>
-            <a:ext uri="{91240B29-F687-4F45-9708-019B960494DF}">
+            <a:ext uri="{91240B29-F687-4f45-9708-019B960494DF}">
               <a14:hiddenLine xmlns:a14="http://schemas.microsoft.com/office/drawing/2010/main" w="12700">
                 <a:solidFill>
                   <a:srgbClr val="000000"/>
@@ -19899,14 +19898,14 @@
             <a:noFill/>
           </a:ln>
           <a:extLst>
-            <a:ext uri="{909E8E84-426E-40DD-AFC4-6F175D3DCCD1}">
+            <a:ext uri="{909E8E84-426E-40dd-AFC4-6F175D3DCCD1}">
               <a14:hiddenFill xmlns:a14="http://schemas.microsoft.com/office/drawing/2010/main">
                 <a:solidFill>
                   <a:srgbClr val="FFFFFF"/>
                 </a:solidFill>
               </a14:hiddenFill>
             </a:ext>
-            <a:ext uri="{91240B29-F687-4F45-9708-019B960494DF}">
+            <a:ext uri="{91240B29-F687-4f45-9708-019B960494DF}">
               <a14:hiddenLine xmlns:a14="http://schemas.microsoft.com/office/drawing/2010/main" w="12700">
                 <a:solidFill>
                   <a:srgbClr val="000000"/>
@@ -20063,14 +20062,14 @@
             <a:noFill/>
           </a:ln>
           <a:extLst>
-            <a:ext uri="{909E8E84-426E-40DD-AFC4-6F175D3DCCD1}">
+            <a:ext uri="{909E8E84-426E-40dd-AFC4-6F175D3DCCD1}">
               <a14:hiddenFill xmlns:a14="http://schemas.microsoft.com/office/drawing/2010/main">
                 <a:solidFill>
                   <a:srgbClr val="FFFFFF"/>
                 </a:solidFill>
               </a14:hiddenFill>
             </a:ext>
-            <a:ext uri="{91240B29-F687-4F45-9708-019B960494DF}">
+            <a:ext uri="{91240B29-F687-4f45-9708-019B960494DF}">
               <a14:hiddenLine xmlns:a14="http://schemas.microsoft.com/office/drawing/2010/main" w="12700">
                 <a:solidFill>
                   <a:srgbClr val="000000"/>
@@ -20224,14 +20223,14 @@
             <a:noFill/>
           </a:ln>
           <a:extLst>
-            <a:ext uri="{909E8E84-426E-40DD-AFC4-6F175D3DCCD1}">
+            <a:ext uri="{909E8E84-426E-40dd-AFC4-6F175D3DCCD1}">
               <a14:hiddenFill xmlns:a14="http://schemas.microsoft.com/office/drawing/2010/main">
                 <a:solidFill>
                   <a:srgbClr val="FFFFFF"/>
                 </a:solidFill>
               </a14:hiddenFill>
             </a:ext>
-            <a:ext uri="{91240B29-F687-4F45-9708-019B960494DF}">
+            <a:ext uri="{91240B29-F687-4f45-9708-019B960494DF}">
               <a14:hiddenLine xmlns:a14="http://schemas.microsoft.com/office/drawing/2010/main" w="12700">
                 <a:solidFill>
                   <a:srgbClr val="000000"/>
@@ -20385,14 +20384,14 @@
             <a:noFill/>
           </a:ln>
           <a:extLst>
-            <a:ext uri="{909E8E84-426E-40DD-AFC4-6F175D3DCCD1}">
+            <a:ext uri="{909E8E84-426E-40dd-AFC4-6F175D3DCCD1}">
               <a14:hiddenFill xmlns:a14="http://schemas.microsoft.com/office/drawing/2010/main">
                 <a:solidFill>
                   <a:srgbClr val="FFFFFF"/>
                 </a:solidFill>
               </a14:hiddenFill>
             </a:ext>
-            <a:ext uri="{91240B29-F687-4F45-9708-019B960494DF}">
+            <a:ext uri="{91240B29-F687-4f45-9708-019B960494DF}">
               <a14:hiddenLine xmlns:a14="http://schemas.microsoft.com/office/drawing/2010/main" w="12700">
                 <a:solidFill>
                   <a:srgbClr val="000000"/>
@@ -20546,14 +20545,14 @@
             <a:noFill/>
           </a:ln>
           <a:extLst>
-            <a:ext uri="{909E8E84-426E-40DD-AFC4-6F175D3DCCD1}">
+            <a:ext uri="{909E8E84-426E-40dd-AFC4-6F175D3DCCD1}">
               <a14:hiddenFill xmlns:a14="http://schemas.microsoft.com/office/drawing/2010/main">
                 <a:solidFill>
                   <a:srgbClr val="FFFFFF"/>
                 </a:solidFill>
               </a14:hiddenFill>
             </a:ext>
-            <a:ext uri="{91240B29-F687-4F45-9708-019B960494DF}">
+            <a:ext uri="{91240B29-F687-4f45-9708-019B960494DF}">
               <a14:hiddenLine xmlns:a14="http://schemas.microsoft.com/office/drawing/2010/main" w="12700">
                 <a:solidFill>
                   <a:srgbClr val="000000"/>
@@ -20707,14 +20706,14 @@
             <a:noFill/>
           </a:ln>
           <a:extLst>
-            <a:ext uri="{909E8E84-426E-40DD-AFC4-6F175D3DCCD1}">
+            <a:ext uri="{909E8E84-426E-40dd-AFC4-6F175D3DCCD1}">
               <a14:hiddenFill xmlns:a14="http://schemas.microsoft.com/office/drawing/2010/main">
                 <a:solidFill>
                   <a:srgbClr val="FFFFFF"/>
                 </a:solidFill>
               </a14:hiddenFill>
             </a:ext>
-            <a:ext uri="{91240B29-F687-4F45-9708-019B960494DF}">
+            <a:ext uri="{91240B29-F687-4f45-9708-019B960494DF}">
               <a14:hiddenLine xmlns:a14="http://schemas.microsoft.com/office/drawing/2010/main" w="12700">
                 <a:solidFill>
                   <a:srgbClr val="000000"/>
@@ -20868,14 +20867,14 @@
             <a:noFill/>
           </a:ln>
           <a:extLst>
-            <a:ext uri="{909E8E84-426E-40DD-AFC4-6F175D3DCCD1}">
+            <a:ext uri="{909E8E84-426E-40dd-AFC4-6F175D3DCCD1}">
               <a14:hiddenFill xmlns:a14="http://schemas.microsoft.com/office/drawing/2010/main">
                 <a:solidFill>
                   <a:srgbClr val="FFFFFF"/>
                 </a:solidFill>
               </a14:hiddenFill>
             </a:ext>
-            <a:ext uri="{91240B29-F687-4F45-9708-019B960494DF}">
+            <a:ext uri="{91240B29-F687-4f45-9708-019B960494DF}">
               <a14:hiddenLine xmlns:a14="http://schemas.microsoft.com/office/drawing/2010/main" w="12700">
                 <a:solidFill>
                   <a:srgbClr val="000000"/>
@@ -21029,14 +21028,14 @@
             <a:noFill/>
           </a:ln>
           <a:extLst>
-            <a:ext uri="{909E8E84-426E-40DD-AFC4-6F175D3DCCD1}">
+            <a:ext uri="{909E8E84-426E-40dd-AFC4-6F175D3DCCD1}">
               <a14:hiddenFill xmlns:a14="http://schemas.microsoft.com/office/drawing/2010/main">
                 <a:solidFill>
                   <a:srgbClr val="FFFFFF"/>
                 </a:solidFill>
               </a14:hiddenFill>
             </a:ext>
-            <a:ext uri="{91240B29-F687-4F45-9708-019B960494DF}">
+            <a:ext uri="{91240B29-F687-4f45-9708-019B960494DF}">
               <a14:hiddenLine xmlns:a14="http://schemas.microsoft.com/office/drawing/2010/main" w="12700">
                 <a:solidFill>
                   <a:srgbClr val="000000"/>
@@ -21190,14 +21189,14 @@
             <a:noFill/>
           </a:ln>
           <a:extLst>
-            <a:ext uri="{909E8E84-426E-40DD-AFC4-6F175D3DCCD1}">
+            <a:ext uri="{909E8E84-426E-40dd-AFC4-6F175D3DCCD1}">
               <a14:hiddenFill xmlns:a14="http://schemas.microsoft.com/office/drawing/2010/main">
                 <a:solidFill>
                   <a:srgbClr val="FFFFFF"/>
                 </a:solidFill>
               </a14:hiddenFill>
             </a:ext>
-            <a:ext uri="{91240B29-F687-4F45-9708-019B960494DF}">
+            <a:ext uri="{91240B29-F687-4f45-9708-019B960494DF}">
               <a14:hiddenLine xmlns:a14="http://schemas.microsoft.com/office/drawing/2010/main" w="12700">
                 <a:solidFill>
                   <a:srgbClr val="000000"/>
@@ -21351,14 +21350,14 @@
             <a:noFill/>
           </a:ln>
           <a:extLst>
-            <a:ext uri="{909E8E84-426E-40DD-AFC4-6F175D3DCCD1}">
+            <a:ext uri="{909E8E84-426E-40dd-AFC4-6F175D3DCCD1}">
               <a14:hiddenFill xmlns:a14="http://schemas.microsoft.com/office/drawing/2010/main">
                 <a:solidFill>
                   <a:srgbClr val="FFFFFF"/>
                 </a:solidFill>
               </a14:hiddenFill>
             </a:ext>
-            <a:ext uri="{91240B29-F687-4F45-9708-019B960494DF}">
+            <a:ext uri="{91240B29-F687-4f45-9708-019B960494DF}">
               <a14:hiddenLine xmlns:a14="http://schemas.microsoft.com/office/drawing/2010/main" w="12700">
                 <a:solidFill>
                   <a:srgbClr val="000000"/>
@@ -21515,14 +21514,14 @@
             <a:noFill/>
           </a:ln>
           <a:extLst>
-            <a:ext uri="{909E8E84-426E-40DD-AFC4-6F175D3DCCD1}">
+            <a:ext uri="{909E8E84-426E-40dd-AFC4-6F175D3DCCD1}">
               <a14:hiddenFill xmlns:a14="http://schemas.microsoft.com/office/drawing/2010/main">
                 <a:solidFill>
                   <a:srgbClr val="FFFFFF"/>
                 </a:solidFill>
               </a14:hiddenFill>
             </a:ext>
-            <a:ext uri="{91240B29-F687-4F45-9708-019B960494DF}">
+            <a:ext uri="{91240B29-F687-4f45-9708-019B960494DF}">
               <a14:hiddenLine xmlns:a14="http://schemas.microsoft.com/office/drawing/2010/main" w="12700">
                 <a:solidFill>
                   <a:srgbClr val="000000"/>
@@ -21679,14 +21678,14 @@
             <a:noFill/>
           </a:ln>
           <a:extLst>
-            <a:ext uri="{909E8E84-426E-40DD-AFC4-6F175D3DCCD1}">
+            <a:ext uri="{909E8E84-426E-40dd-AFC4-6F175D3DCCD1}">
               <a14:hiddenFill xmlns:a14="http://schemas.microsoft.com/office/drawing/2010/main">
                 <a:solidFill>
                   <a:srgbClr val="FFFFFF"/>
                 </a:solidFill>
               </a14:hiddenFill>
             </a:ext>
-            <a:ext uri="{91240B29-F687-4F45-9708-019B960494DF}">
+            <a:ext uri="{91240B29-F687-4f45-9708-019B960494DF}">
               <a14:hiddenLine xmlns:a14="http://schemas.microsoft.com/office/drawing/2010/main" w="12700">
                 <a:solidFill>
                   <a:srgbClr val="000000"/>
@@ -21843,14 +21842,14 @@
             <a:noFill/>
           </a:ln>
           <a:extLst>
-            <a:ext uri="{909E8E84-426E-40DD-AFC4-6F175D3DCCD1}">
+            <a:ext uri="{909E8E84-426E-40dd-AFC4-6F175D3DCCD1}">
               <a14:hiddenFill xmlns:a14="http://schemas.microsoft.com/office/drawing/2010/main">
                 <a:solidFill>
                   <a:srgbClr val="FFFFFF"/>
                 </a:solidFill>
               </a14:hiddenFill>
             </a:ext>
-            <a:ext uri="{91240B29-F687-4F45-9708-019B960494DF}">
+            <a:ext uri="{91240B29-F687-4f45-9708-019B960494DF}">
               <a14:hiddenLine xmlns:a14="http://schemas.microsoft.com/office/drawing/2010/main" w="12700">
                 <a:solidFill>
                   <a:srgbClr val="000000"/>
@@ -22007,14 +22006,14 @@
             <a:noFill/>
           </a:ln>
           <a:extLst>
-            <a:ext uri="{909E8E84-426E-40DD-AFC4-6F175D3DCCD1}">
+            <a:ext uri="{909E8E84-426E-40dd-AFC4-6F175D3DCCD1}">
               <a14:hiddenFill xmlns:a14="http://schemas.microsoft.com/office/drawing/2010/main">
                 <a:solidFill>
                   <a:srgbClr val="FFFFFF"/>
                 </a:solidFill>
               </a14:hiddenFill>
             </a:ext>
-            <a:ext uri="{91240B29-F687-4F45-9708-019B960494DF}">
+            <a:ext uri="{91240B29-F687-4f45-9708-019B960494DF}">
               <a14:hiddenLine xmlns:a14="http://schemas.microsoft.com/office/drawing/2010/main" w="12700">
                 <a:solidFill>
                   <a:srgbClr val="000000"/>
@@ -22171,14 +22170,14 @@
             <a:noFill/>
           </a:ln>
           <a:extLst>
-            <a:ext uri="{909E8E84-426E-40DD-AFC4-6F175D3DCCD1}">
+            <a:ext uri="{909E8E84-426E-40dd-AFC4-6F175D3DCCD1}">
               <a14:hiddenFill xmlns:a14="http://schemas.microsoft.com/office/drawing/2010/main">
                 <a:solidFill>
                   <a:srgbClr val="FFFFFF"/>
                 </a:solidFill>
               </a14:hiddenFill>
             </a:ext>
-            <a:ext uri="{91240B29-F687-4F45-9708-019B960494DF}">
+            <a:ext uri="{91240B29-F687-4f45-9708-019B960494DF}">
               <a14:hiddenLine xmlns:a14="http://schemas.microsoft.com/office/drawing/2010/main" w="12700">
                 <a:solidFill>
                   <a:srgbClr val="000000"/>
@@ -22335,14 +22334,14 @@
             <a:noFill/>
           </a:ln>
           <a:extLst>
-            <a:ext uri="{909E8E84-426E-40DD-AFC4-6F175D3DCCD1}">
+            <a:ext uri="{909E8E84-426E-40dd-AFC4-6F175D3DCCD1}">
               <a14:hiddenFill xmlns:a14="http://schemas.microsoft.com/office/drawing/2010/main">
                 <a:solidFill>
                   <a:srgbClr val="FFFFFF"/>
                 </a:solidFill>
               </a14:hiddenFill>
             </a:ext>
-            <a:ext uri="{91240B29-F687-4F45-9708-019B960494DF}">
+            <a:ext uri="{91240B29-F687-4f45-9708-019B960494DF}">
               <a14:hiddenLine xmlns:a14="http://schemas.microsoft.com/office/drawing/2010/main" w="12700">
                 <a:solidFill>
                   <a:srgbClr val="000000"/>
@@ -22499,14 +22498,14 @@
             <a:noFill/>
           </a:ln>
           <a:extLst>
-            <a:ext uri="{909E8E84-426E-40DD-AFC4-6F175D3DCCD1}">
+            <a:ext uri="{909E8E84-426E-40dd-AFC4-6F175D3DCCD1}">
               <a14:hiddenFill xmlns:a14="http://schemas.microsoft.com/office/drawing/2010/main">
                 <a:solidFill>
                   <a:srgbClr val="FFFFFF"/>
                 </a:solidFill>
               </a14:hiddenFill>
             </a:ext>
-            <a:ext uri="{91240B29-F687-4F45-9708-019B960494DF}">
+            <a:ext uri="{91240B29-F687-4f45-9708-019B960494DF}">
               <a14:hiddenLine xmlns:a14="http://schemas.microsoft.com/office/drawing/2010/main" w="12700">
                 <a:solidFill>
                   <a:srgbClr val="000000"/>
@@ -22663,14 +22662,14 @@
             <a:noFill/>
           </a:ln>
           <a:extLst>
-            <a:ext uri="{909E8E84-426E-40DD-AFC4-6F175D3DCCD1}">
+            <a:ext uri="{909E8E84-426E-40dd-AFC4-6F175D3DCCD1}">
               <a14:hiddenFill xmlns:a14="http://schemas.microsoft.com/office/drawing/2010/main">
                 <a:solidFill>
                   <a:srgbClr val="FFFFFF"/>
                 </a:solidFill>
               </a14:hiddenFill>
             </a:ext>
-            <a:ext uri="{91240B29-F687-4F45-9708-019B960494DF}">
+            <a:ext uri="{91240B29-F687-4f45-9708-019B960494DF}">
               <a14:hiddenLine xmlns:a14="http://schemas.microsoft.com/office/drawing/2010/main" w="12700">
                 <a:solidFill>
                   <a:srgbClr val="000000"/>
@@ -22824,14 +22823,14 @@
             <a:noFill/>
           </a:ln>
           <a:extLst>
-            <a:ext uri="{909E8E84-426E-40DD-AFC4-6F175D3DCCD1}">
+            <a:ext uri="{909E8E84-426E-40dd-AFC4-6F175D3DCCD1}">
               <a14:hiddenFill xmlns:a14="http://schemas.microsoft.com/office/drawing/2010/main">
                 <a:solidFill>
                   <a:srgbClr val="FFFFFF"/>
                 </a:solidFill>
               </a14:hiddenFill>
             </a:ext>
-            <a:ext uri="{91240B29-F687-4F45-9708-019B960494DF}">
+            <a:ext uri="{91240B29-F687-4f45-9708-019B960494DF}">
               <a14:hiddenLine xmlns:a14="http://schemas.microsoft.com/office/drawing/2010/main" w="12700">
                 <a:solidFill>
                   <a:srgbClr val="000000"/>
@@ -22985,14 +22984,14 @@
             <a:noFill/>
           </a:ln>
           <a:extLst>
-            <a:ext uri="{909E8E84-426E-40DD-AFC4-6F175D3DCCD1}">
+            <a:ext uri="{909E8E84-426E-40dd-AFC4-6F175D3DCCD1}">
               <a14:hiddenFill xmlns:a14="http://schemas.microsoft.com/office/drawing/2010/main">
                 <a:solidFill>
                   <a:srgbClr val="FFFFFF"/>
                 </a:solidFill>
               </a14:hiddenFill>
             </a:ext>
-            <a:ext uri="{91240B29-F687-4F45-9708-019B960494DF}">
+            <a:ext uri="{91240B29-F687-4f45-9708-019B960494DF}">
               <a14:hiddenLine xmlns:a14="http://schemas.microsoft.com/office/drawing/2010/main" w="12700">
                 <a:solidFill>
                   <a:srgbClr val="000000"/>
@@ -23146,14 +23145,14 @@
             <a:noFill/>
           </a:ln>
           <a:extLst>
-            <a:ext uri="{909E8E84-426E-40DD-AFC4-6F175D3DCCD1}">
+            <a:ext uri="{909E8E84-426E-40dd-AFC4-6F175D3DCCD1}">
               <a14:hiddenFill xmlns:a14="http://schemas.microsoft.com/office/drawing/2010/main">
                 <a:solidFill>
                   <a:srgbClr val="FFFFFF"/>
                 </a:solidFill>
               </a14:hiddenFill>
             </a:ext>
-            <a:ext uri="{91240B29-F687-4F45-9708-019B960494DF}">
+            <a:ext uri="{91240B29-F687-4f45-9708-019B960494DF}">
               <a14:hiddenLine xmlns:a14="http://schemas.microsoft.com/office/drawing/2010/main" w="12700">
                 <a:solidFill>
                   <a:srgbClr val="000000"/>
@@ -23307,14 +23306,14 @@
             <a:noFill/>
           </a:ln>
           <a:extLst>
-            <a:ext uri="{909E8E84-426E-40DD-AFC4-6F175D3DCCD1}">
+            <a:ext uri="{909E8E84-426E-40dd-AFC4-6F175D3DCCD1}">
               <a14:hiddenFill xmlns:a14="http://schemas.microsoft.com/office/drawing/2010/main">
                 <a:solidFill>
                   <a:srgbClr val="FFFFFF"/>
                 </a:solidFill>
               </a14:hiddenFill>
             </a:ext>
-            <a:ext uri="{91240B29-F687-4F45-9708-019B960494DF}">
+            <a:ext uri="{91240B29-F687-4f45-9708-019B960494DF}">
               <a14:hiddenLine xmlns:a14="http://schemas.microsoft.com/office/drawing/2010/main" w="12700">
                 <a:solidFill>
                   <a:srgbClr val="000000"/>
@@ -23468,14 +23467,14 @@
             <a:noFill/>
           </a:ln>
           <a:extLst>
-            <a:ext uri="{909E8E84-426E-40DD-AFC4-6F175D3DCCD1}">
+            <a:ext uri="{909E8E84-426E-40dd-AFC4-6F175D3DCCD1}">
               <a14:hiddenFill xmlns:a14="http://schemas.microsoft.com/office/drawing/2010/main">
                 <a:solidFill>
                   <a:srgbClr val="FFFFFF"/>
                 </a:solidFill>
               </a14:hiddenFill>
             </a:ext>
-            <a:ext uri="{91240B29-F687-4F45-9708-019B960494DF}">
+            <a:ext uri="{91240B29-F687-4f45-9708-019B960494DF}">
               <a14:hiddenLine xmlns:a14="http://schemas.microsoft.com/office/drawing/2010/main" w="12700">
                 <a:solidFill>
                   <a:srgbClr val="000000"/>
@@ -23629,14 +23628,14 @@
             <a:noFill/>
           </a:ln>
           <a:extLst>
-            <a:ext uri="{909E8E84-426E-40DD-AFC4-6F175D3DCCD1}">
+            <a:ext uri="{909E8E84-426E-40dd-AFC4-6F175D3DCCD1}">
               <a14:hiddenFill xmlns:a14="http://schemas.microsoft.com/office/drawing/2010/main">
                 <a:solidFill>
                   <a:srgbClr val="FFFFFF"/>
                 </a:solidFill>
               </a14:hiddenFill>
             </a:ext>
-            <a:ext uri="{91240B29-F687-4F45-9708-019B960494DF}">
+            <a:ext uri="{91240B29-F687-4f45-9708-019B960494DF}">
               <a14:hiddenLine xmlns:a14="http://schemas.microsoft.com/office/drawing/2010/main" w="12700">
                 <a:solidFill>
                   <a:srgbClr val="000000"/>
@@ -23790,14 +23789,14 @@
             <a:noFill/>
           </a:ln>
           <a:extLst>
-            <a:ext uri="{909E8E84-426E-40DD-AFC4-6F175D3DCCD1}">
+            <a:ext uri="{909E8E84-426E-40dd-AFC4-6F175D3DCCD1}">
               <a14:hiddenFill xmlns:a14="http://schemas.microsoft.com/office/drawing/2010/main">
                 <a:solidFill>
                   <a:srgbClr val="FFFFFF"/>
                 </a:solidFill>
               </a14:hiddenFill>
             </a:ext>
-            <a:ext uri="{91240B29-F687-4F45-9708-019B960494DF}">
+            <a:ext uri="{91240B29-F687-4f45-9708-019B960494DF}">
               <a14:hiddenLine xmlns:a14="http://schemas.microsoft.com/office/drawing/2010/main" w="12700">
                 <a:solidFill>
                   <a:srgbClr val="000000"/>
@@ -23951,14 +23950,14 @@
             <a:noFill/>
           </a:ln>
           <a:extLst>
-            <a:ext uri="{909E8E84-426E-40DD-AFC4-6F175D3DCCD1}">
+            <a:ext uri="{909E8E84-426E-40dd-AFC4-6F175D3DCCD1}">
               <a14:hiddenFill xmlns:a14="http://schemas.microsoft.com/office/drawing/2010/main">
                 <a:solidFill>
                   <a:srgbClr val="FFFFFF"/>
                 </a:solidFill>
               </a14:hiddenFill>
             </a:ext>
-            <a:ext uri="{91240B29-F687-4F45-9708-019B960494DF}">
+            <a:ext uri="{91240B29-F687-4f45-9708-019B960494DF}">
               <a14:hiddenLine xmlns:a14="http://schemas.microsoft.com/office/drawing/2010/main" w="12700">
                 <a:solidFill>
                   <a:srgbClr val="000000"/>
@@ -24112,14 +24111,14 @@
             <a:noFill/>
           </a:ln>
           <a:extLst>
-            <a:ext uri="{909E8E84-426E-40DD-AFC4-6F175D3DCCD1}">
+            <a:ext uri="{909E8E84-426E-40dd-AFC4-6F175D3DCCD1}">
               <a14:hiddenFill xmlns:a14="http://schemas.microsoft.com/office/drawing/2010/main">
                 <a:solidFill>
                   <a:srgbClr val="FFFFFF"/>
                 </a:solidFill>
               </a14:hiddenFill>
             </a:ext>
-            <a:ext uri="{91240B29-F687-4F45-9708-019B960494DF}">
+            <a:ext uri="{91240B29-F687-4f45-9708-019B960494DF}">
               <a14:hiddenLine xmlns:a14="http://schemas.microsoft.com/office/drawing/2010/main" w="12700">
                 <a:solidFill>
                   <a:srgbClr val="000000"/>
@@ -24273,14 +24272,14 @@
             <a:noFill/>
           </a:ln>
           <a:extLst>
-            <a:ext uri="{909E8E84-426E-40DD-AFC4-6F175D3DCCD1}">
+            <a:ext uri="{909E8E84-426E-40dd-AFC4-6F175D3DCCD1}">
               <a14:hiddenFill xmlns:a14="http://schemas.microsoft.com/office/drawing/2010/main">
                 <a:solidFill>
                   <a:srgbClr val="FFFFFF"/>
                 </a:solidFill>
               </a14:hiddenFill>
             </a:ext>
-            <a:ext uri="{91240B29-F687-4F45-9708-019B960494DF}">
+            <a:ext uri="{91240B29-F687-4f45-9708-019B960494DF}">
               <a14:hiddenLine xmlns:a14="http://schemas.microsoft.com/office/drawing/2010/main" w="12700">
                 <a:solidFill>
                   <a:srgbClr val="000000"/>
@@ -24437,14 +24436,14 @@
             <a:noFill/>
           </a:ln>
           <a:extLst>
-            <a:ext uri="{909E8E84-426E-40DD-AFC4-6F175D3DCCD1}">
+            <a:ext uri="{909E8E84-426E-40dd-AFC4-6F175D3DCCD1}">
               <a14:hiddenFill xmlns:a14="http://schemas.microsoft.com/office/drawing/2010/main">
                 <a:solidFill>
                   <a:srgbClr val="FFFFFF"/>
                 </a:solidFill>
               </a14:hiddenFill>
             </a:ext>
-            <a:ext uri="{91240B29-F687-4F45-9708-019B960494DF}">
+            <a:ext uri="{91240B29-F687-4f45-9708-019B960494DF}">
               <a14:hiddenLine xmlns:a14="http://schemas.microsoft.com/office/drawing/2010/main" w="12700">
                 <a:solidFill>
                   <a:srgbClr val="000000"/>
@@ -24601,14 +24600,14 @@
             <a:noFill/>
           </a:ln>
           <a:extLst>
-            <a:ext uri="{909E8E84-426E-40DD-AFC4-6F175D3DCCD1}">
+            <a:ext uri="{909E8E84-426E-40dd-AFC4-6F175D3DCCD1}">
               <a14:hiddenFill xmlns:a14="http://schemas.microsoft.com/office/drawing/2010/main">
                 <a:solidFill>
                   <a:srgbClr val="FFFFFF"/>
                 </a:solidFill>
               </a14:hiddenFill>
             </a:ext>
-            <a:ext uri="{91240B29-F687-4F45-9708-019B960494DF}">
+            <a:ext uri="{91240B29-F687-4f45-9708-019B960494DF}">
               <a14:hiddenLine xmlns:a14="http://schemas.microsoft.com/office/drawing/2010/main" w="12700">
                 <a:solidFill>
                   <a:srgbClr val="000000"/>
@@ -24765,14 +24764,14 @@
             <a:noFill/>
           </a:ln>
           <a:extLst>
-            <a:ext uri="{909E8E84-426E-40DD-AFC4-6F175D3DCCD1}">
+            <a:ext uri="{909E8E84-426E-40dd-AFC4-6F175D3DCCD1}">
               <a14:hiddenFill xmlns:a14="http://schemas.microsoft.com/office/drawing/2010/main">
                 <a:solidFill>
                   <a:srgbClr val="FFFFFF"/>
                 </a:solidFill>
               </a14:hiddenFill>
             </a:ext>
-            <a:ext uri="{91240B29-F687-4F45-9708-019B960494DF}">
+            <a:ext uri="{91240B29-F687-4f45-9708-019B960494DF}">
               <a14:hiddenLine xmlns:a14="http://schemas.microsoft.com/office/drawing/2010/main" w="12700">
                 <a:solidFill>
                   <a:srgbClr val="000000"/>
@@ -24929,14 +24928,14 @@
             <a:noFill/>
           </a:ln>
           <a:extLst>
-            <a:ext uri="{909E8E84-426E-40DD-AFC4-6F175D3DCCD1}">
+            <a:ext uri="{909E8E84-426E-40dd-AFC4-6F175D3DCCD1}">
               <a14:hiddenFill xmlns:a14="http://schemas.microsoft.com/office/drawing/2010/main">
                 <a:solidFill>
                   <a:srgbClr val="FFFFFF"/>
                 </a:solidFill>
               </a14:hiddenFill>
             </a:ext>
-            <a:ext uri="{91240B29-F687-4F45-9708-019B960494DF}">
+            <a:ext uri="{91240B29-F687-4f45-9708-019B960494DF}">
               <a14:hiddenLine xmlns:a14="http://schemas.microsoft.com/office/drawing/2010/main" w="12700">
                 <a:solidFill>
                   <a:srgbClr val="000000"/>
@@ -25093,14 +25092,14 @@
             <a:noFill/>
           </a:ln>
           <a:extLst>
-            <a:ext uri="{909E8E84-426E-40DD-AFC4-6F175D3DCCD1}">
+            <a:ext uri="{909E8E84-426E-40dd-AFC4-6F175D3DCCD1}">
               <a14:hiddenFill xmlns:a14="http://schemas.microsoft.com/office/drawing/2010/main">
                 <a:solidFill>
                   <a:srgbClr val="FFFFFF"/>
                 </a:solidFill>
               </a14:hiddenFill>
             </a:ext>
-            <a:ext uri="{91240B29-F687-4F45-9708-019B960494DF}">
+            <a:ext uri="{91240B29-F687-4f45-9708-019B960494DF}">
               <a14:hiddenLine xmlns:a14="http://schemas.microsoft.com/office/drawing/2010/main" w="12700">
                 <a:solidFill>
                   <a:srgbClr val="000000"/>
@@ -25257,14 +25256,14 @@
             <a:noFill/>
           </a:ln>
           <a:extLst>
-            <a:ext uri="{909E8E84-426E-40DD-AFC4-6F175D3DCCD1}">
+            <a:ext uri="{909E8E84-426E-40dd-AFC4-6F175D3DCCD1}">
               <a14:hiddenFill xmlns:a14="http://schemas.microsoft.com/office/drawing/2010/main">
                 <a:solidFill>
                   <a:srgbClr val="FFFFFF"/>
                 </a:solidFill>
               </a14:hiddenFill>
             </a:ext>
-            <a:ext uri="{91240B29-F687-4F45-9708-019B960494DF}">
+            <a:ext uri="{91240B29-F687-4f45-9708-019B960494DF}">
               <a14:hiddenLine xmlns:a14="http://schemas.microsoft.com/office/drawing/2010/main" w="12700">
                 <a:solidFill>
                   <a:srgbClr val="000000"/>
@@ -25421,14 +25420,14 @@
             <a:noFill/>
           </a:ln>
           <a:extLst>
-            <a:ext uri="{909E8E84-426E-40DD-AFC4-6F175D3DCCD1}">
+            <a:ext uri="{909E8E84-426E-40dd-AFC4-6F175D3DCCD1}">
               <a14:hiddenFill xmlns:a14="http://schemas.microsoft.com/office/drawing/2010/main">
                 <a:solidFill>
                   <a:srgbClr val="FFFFFF"/>
                 </a:solidFill>
               </a14:hiddenFill>
             </a:ext>
-            <a:ext uri="{91240B29-F687-4F45-9708-019B960494DF}">
+            <a:ext uri="{91240B29-F687-4f45-9708-019B960494DF}">
               <a14:hiddenLine xmlns:a14="http://schemas.microsoft.com/office/drawing/2010/main" w="12700">
                 <a:solidFill>
                   <a:srgbClr val="000000"/>
@@ -25585,14 +25584,14 @@
             <a:noFill/>
           </a:ln>
           <a:extLst>
-            <a:ext uri="{909E8E84-426E-40DD-AFC4-6F175D3DCCD1}">
+            <a:ext uri="{909E8E84-426E-40dd-AFC4-6F175D3DCCD1}">
               <a14:hiddenFill xmlns:a14="http://schemas.microsoft.com/office/drawing/2010/main">
                 <a:solidFill>
                   <a:srgbClr val="FFFFFF"/>
                 </a:solidFill>
               </a14:hiddenFill>
             </a:ext>
-            <a:ext uri="{91240B29-F687-4F45-9708-019B960494DF}">
+            <a:ext uri="{91240B29-F687-4f45-9708-019B960494DF}">
               <a14:hiddenLine xmlns:a14="http://schemas.microsoft.com/office/drawing/2010/main" w="12700">
                 <a:solidFill>
                   <a:srgbClr val="000000"/>
@@ -25749,14 +25748,14 @@
             <a:noFill/>
           </a:ln>
           <a:extLst>
-            <a:ext uri="{909E8E84-426E-40DD-AFC4-6F175D3DCCD1}">
+            <a:ext uri="{909E8E84-426E-40dd-AFC4-6F175D3DCCD1}">
               <a14:hiddenFill xmlns:a14="http://schemas.microsoft.com/office/drawing/2010/main">
                 <a:solidFill>
                   <a:srgbClr val="FFFFFF"/>
                 </a:solidFill>
               </a14:hiddenFill>
             </a:ext>
-            <a:ext uri="{91240B29-F687-4F45-9708-019B960494DF}">
+            <a:ext uri="{91240B29-F687-4f45-9708-019B960494DF}">
               <a14:hiddenLine xmlns:a14="http://schemas.microsoft.com/office/drawing/2010/main" w="12700">
                 <a:solidFill>
                   <a:srgbClr val="000000"/>
@@ -25913,14 +25912,14 @@
             <a:noFill/>
           </a:ln>
           <a:extLst>
-            <a:ext uri="{909E8E84-426E-40DD-AFC4-6F175D3DCCD1}">
+            <a:ext uri="{909E8E84-426E-40dd-AFC4-6F175D3DCCD1}">
               <a14:hiddenFill xmlns:a14="http://schemas.microsoft.com/office/drawing/2010/main">
                 <a:solidFill>
                   <a:srgbClr val="FFFFFF"/>
                 </a:solidFill>
               </a14:hiddenFill>
             </a:ext>
-            <a:ext uri="{91240B29-F687-4F45-9708-019B960494DF}">
+            <a:ext uri="{91240B29-F687-4f45-9708-019B960494DF}">
               <a14:hiddenLine xmlns:a14="http://schemas.microsoft.com/office/drawing/2010/main" w="12700">
                 <a:solidFill>
                   <a:srgbClr val="000000"/>
@@ -26077,14 +26076,14 @@
             <a:noFill/>
           </a:ln>
           <a:extLst>
-            <a:ext uri="{909E8E84-426E-40DD-AFC4-6F175D3DCCD1}">
+            <a:ext uri="{909E8E84-426E-40dd-AFC4-6F175D3DCCD1}">
               <a14:hiddenFill xmlns:a14="http://schemas.microsoft.com/office/drawing/2010/main">
                 <a:solidFill>
                   <a:srgbClr val="FFFFFF"/>
                 </a:solidFill>
               </a14:hiddenFill>
             </a:ext>
-            <a:ext uri="{91240B29-F687-4F45-9708-019B960494DF}">
+            <a:ext uri="{91240B29-F687-4f45-9708-019B960494DF}">
               <a14:hiddenLine xmlns:a14="http://schemas.microsoft.com/office/drawing/2010/main" w="12700">
                 <a:solidFill>
                   <a:srgbClr val="000000"/>
@@ -26241,14 +26240,14 @@
             <a:noFill/>
           </a:ln>
           <a:extLst>
-            <a:ext uri="{909E8E84-426E-40DD-AFC4-6F175D3DCCD1}">
+            <a:ext uri="{909E8E84-426E-40dd-AFC4-6F175D3DCCD1}">
               <a14:hiddenFill xmlns:a14="http://schemas.microsoft.com/office/drawing/2010/main">
                 <a:solidFill>
                   <a:srgbClr val="FFFFFF"/>
                 </a:solidFill>
               </a14:hiddenFill>
             </a:ext>
-            <a:ext uri="{91240B29-F687-4F45-9708-019B960494DF}">
+            <a:ext uri="{91240B29-F687-4f45-9708-019B960494DF}">
               <a14:hiddenLine xmlns:a14="http://schemas.microsoft.com/office/drawing/2010/main" w="12700">
                 <a:solidFill>
                   <a:srgbClr val="000000"/>
@@ -26405,14 +26404,14 @@
             <a:noFill/>
           </a:ln>
           <a:extLst>
-            <a:ext uri="{909E8E84-426E-40DD-AFC4-6F175D3DCCD1}">
+            <a:ext uri="{909E8E84-426E-40dd-AFC4-6F175D3DCCD1}">
               <a14:hiddenFill xmlns:a14="http://schemas.microsoft.com/office/drawing/2010/main">
                 <a:solidFill>
                   <a:srgbClr val="FFFFFF"/>
                 </a:solidFill>
               </a14:hiddenFill>
             </a:ext>
-            <a:ext uri="{91240B29-F687-4F45-9708-019B960494DF}">
+            <a:ext uri="{91240B29-F687-4f45-9708-019B960494DF}">
               <a14:hiddenLine xmlns:a14="http://schemas.microsoft.com/office/drawing/2010/main" w="12700">
                 <a:solidFill>
                   <a:srgbClr val="000000"/>
@@ -26569,14 +26568,14 @@
             <a:noFill/>
           </a:ln>
           <a:extLst>
-            <a:ext uri="{909E8E84-426E-40DD-AFC4-6F175D3DCCD1}">
+            <a:ext uri="{909E8E84-426E-40dd-AFC4-6F175D3DCCD1}">
               <a14:hiddenFill xmlns:a14="http://schemas.microsoft.com/office/drawing/2010/main">
                 <a:solidFill>
                   <a:srgbClr val="FFFFFF"/>
                 </a:solidFill>
               </a14:hiddenFill>
             </a:ext>
-            <a:ext uri="{91240B29-F687-4F45-9708-019B960494DF}">
+            <a:ext uri="{91240B29-F687-4f45-9708-019B960494DF}">
               <a14:hiddenLine xmlns:a14="http://schemas.microsoft.com/office/drawing/2010/main" w="12700">
                 <a:solidFill>
                   <a:srgbClr val="000000"/>
@@ -26733,14 +26732,14 @@
             <a:noFill/>
           </a:ln>
           <a:extLst>
-            <a:ext uri="{909E8E84-426E-40DD-AFC4-6F175D3DCCD1}">
+            <a:ext uri="{909E8E84-426E-40dd-AFC4-6F175D3DCCD1}">
               <a14:hiddenFill xmlns:a14="http://schemas.microsoft.com/office/drawing/2010/main">
                 <a:solidFill>
                   <a:srgbClr val="FFFFFF"/>
                 </a:solidFill>
               </a14:hiddenFill>
             </a:ext>
-            <a:ext uri="{91240B29-F687-4F45-9708-019B960494DF}">
+            <a:ext uri="{91240B29-F687-4f45-9708-019B960494DF}">
               <a14:hiddenLine xmlns:a14="http://schemas.microsoft.com/office/drawing/2010/main" w="12700">
                 <a:solidFill>
                   <a:srgbClr val="000000"/>
@@ -26897,14 +26896,14 @@
             <a:noFill/>
           </a:ln>
           <a:extLst>
-            <a:ext uri="{909E8E84-426E-40DD-AFC4-6F175D3DCCD1}">
+            <a:ext uri="{909E8E84-426E-40dd-AFC4-6F175D3DCCD1}">
               <a14:hiddenFill xmlns:a14="http://schemas.microsoft.com/office/drawing/2010/main">
                 <a:solidFill>
                   <a:srgbClr val="FFFFFF"/>
                 </a:solidFill>
               </a14:hiddenFill>
             </a:ext>
-            <a:ext uri="{91240B29-F687-4F45-9708-019B960494DF}">
+            <a:ext uri="{91240B29-F687-4f45-9708-019B960494DF}">
               <a14:hiddenLine xmlns:a14="http://schemas.microsoft.com/office/drawing/2010/main" w="12700">
                 <a:solidFill>
                   <a:srgbClr val="000000"/>
@@ -27061,14 +27060,14 @@
             <a:noFill/>
           </a:ln>
           <a:extLst>
-            <a:ext uri="{909E8E84-426E-40DD-AFC4-6F175D3DCCD1}">
+            <a:ext uri="{909E8E84-426E-40dd-AFC4-6F175D3DCCD1}">
               <a14:hiddenFill xmlns:a14="http://schemas.microsoft.com/office/drawing/2010/main">
                 <a:solidFill>
                   <a:srgbClr val="FFFFFF"/>
                 </a:solidFill>
               </a14:hiddenFill>
             </a:ext>
-            <a:ext uri="{91240B29-F687-4F45-9708-019B960494DF}">
+            <a:ext uri="{91240B29-F687-4f45-9708-019B960494DF}">
               <a14:hiddenLine xmlns:a14="http://schemas.microsoft.com/office/drawing/2010/main" w="12700">
                 <a:solidFill>
                   <a:srgbClr val="000000"/>
@@ -27225,14 +27224,14 @@
             <a:noFill/>
           </a:ln>
           <a:extLst>
-            <a:ext uri="{909E8E84-426E-40DD-AFC4-6F175D3DCCD1}">
+            <a:ext uri="{909E8E84-426E-40dd-AFC4-6F175D3DCCD1}">
               <a14:hiddenFill xmlns:a14="http://schemas.microsoft.com/office/drawing/2010/main">
                 <a:solidFill>
                   <a:srgbClr val="FFFFFF"/>
                 </a:solidFill>
               </a14:hiddenFill>
             </a:ext>
-            <a:ext uri="{91240B29-F687-4F45-9708-019B960494DF}">
+            <a:ext uri="{91240B29-F687-4f45-9708-019B960494DF}">
               <a14:hiddenLine xmlns:a14="http://schemas.microsoft.com/office/drawing/2010/main" w="12700">
                 <a:solidFill>
                   <a:srgbClr val="000000"/>
@@ -27389,14 +27388,14 @@
             <a:noFill/>
           </a:ln>
           <a:extLst>
-            <a:ext uri="{909E8E84-426E-40DD-AFC4-6F175D3DCCD1}">
+            <a:ext uri="{909E8E84-426E-40dd-AFC4-6F175D3DCCD1}">
               <a14:hiddenFill xmlns:a14="http://schemas.microsoft.com/office/drawing/2010/main">
                 <a:solidFill>
                   <a:srgbClr val="FFFFFF"/>
                 </a:solidFill>
               </a14:hiddenFill>
             </a:ext>
-            <a:ext uri="{91240B29-F687-4F45-9708-019B960494DF}">
+            <a:ext uri="{91240B29-F687-4f45-9708-019B960494DF}">
               <a14:hiddenLine xmlns:a14="http://schemas.microsoft.com/office/drawing/2010/main" w="12700">
                 <a:solidFill>
                   <a:srgbClr val="000000"/>
@@ -27553,14 +27552,14 @@
             <a:noFill/>
           </a:ln>
           <a:extLst>
-            <a:ext uri="{909E8E84-426E-40DD-AFC4-6F175D3DCCD1}">
+            <a:ext uri="{909E8E84-426E-40dd-AFC4-6F175D3DCCD1}">
               <a14:hiddenFill xmlns:a14="http://schemas.microsoft.com/office/drawing/2010/main">
                 <a:solidFill>
                   <a:srgbClr val="FFFFFF"/>
                 </a:solidFill>
               </a14:hiddenFill>
             </a:ext>
-            <a:ext uri="{91240B29-F687-4F45-9708-019B960494DF}">
+            <a:ext uri="{91240B29-F687-4f45-9708-019B960494DF}">
               <a14:hiddenLine xmlns:a14="http://schemas.microsoft.com/office/drawing/2010/main" w="12700">
                 <a:solidFill>
                   <a:srgbClr val="000000"/>
@@ -27717,14 +27716,14 @@
             <a:noFill/>
           </a:ln>
           <a:extLst>
-            <a:ext uri="{909E8E84-426E-40DD-AFC4-6F175D3DCCD1}">
+            <a:ext uri="{909E8E84-426E-40dd-AFC4-6F175D3DCCD1}">
               <a14:hiddenFill xmlns:a14="http://schemas.microsoft.com/office/drawing/2010/main">
                 <a:solidFill>
                   <a:srgbClr val="FFFFFF"/>
                 </a:solidFill>
               </a14:hiddenFill>
             </a:ext>
-            <a:ext uri="{91240B29-F687-4F45-9708-019B960494DF}">
+            <a:ext uri="{91240B29-F687-4f45-9708-019B960494DF}">
               <a14:hiddenLine xmlns:a14="http://schemas.microsoft.com/office/drawing/2010/main" w="12700">
                 <a:solidFill>
                   <a:srgbClr val="000000"/>
@@ -27886,7 +27885,7 @@
             <a:tailEnd/>
           </a:ln>
           <a:extLst>
-            <a:ext uri="{909E8E84-426E-40DD-AFC4-6F175D3DCCD1}">
+            <a:ext uri="{909E8E84-426E-40dd-AFC4-6F175D3DCCD1}">
               <a14:hiddenFill xmlns:a14="http://schemas.microsoft.com/office/drawing/2010/main">
                 <a:noFill/>
               </a14:hiddenFill>
@@ -27929,7 +27928,7 @@
             <a:tailEnd/>
           </a:ln>
           <a:extLst>
-            <a:ext uri="{909E8E84-426E-40DD-AFC4-6F175D3DCCD1}">
+            <a:ext uri="{909E8E84-426E-40dd-AFC4-6F175D3DCCD1}">
               <a14:hiddenFill xmlns:a14="http://schemas.microsoft.com/office/drawing/2010/main">
                 <a:noFill/>
               </a14:hiddenFill>
@@ -27972,7 +27971,7 @@
             <a:tailEnd/>
           </a:ln>
           <a:extLst>
-            <a:ext uri="{909E8E84-426E-40DD-AFC4-6F175D3DCCD1}">
+            <a:ext uri="{909E8E84-426E-40dd-AFC4-6F175D3DCCD1}">
               <a14:hiddenFill xmlns:a14="http://schemas.microsoft.com/office/drawing/2010/main">
                 <a:noFill/>
               </a14:hiddenFill>
@@ -28015,7 +28014,7 @@
             <a:tailEnd/>
           </a:ln>
           <a:extLst>
-            <a:ext uri="{909E8E84-426E-40DD-AFC4-6F175D3DCCD1}">
+            <a:ext uri="{909E8E84-426E-40dd-AFC4-6F175D3DCCD1}">
               <a14:hiddenFill xmlns:a14="http://schemas.microsoft.com/office/drawing/2010/main">
                 <a:noFill/>
               </a14:hiddenFill>
@@ -28058,7 +28057,7 @@
             <a:tailEnd/>
           </a:ln>
           <a:extLst>
-            <a:ext uri="{909E8E84-426E-40DD-AFC4-6F175D3DCCD1}">
+            <a:ext uri="{909E8E84-426E-40dd-AFC4-6F175D3DCCD1}">
               <a14:hiddenFill xmlns:a14="http://schemas.microsoft.com/office/drawing/2010/main">
                 <a:noFill/>
               </a14:hiddenFill>
@@ -28101,7 +28100,7 @@
             <a:tailEnd/>
           </a:ln>
           <a:extLst>
-            <a:ext uri="{909E8E84-426E-40DD-AFC4-6F175D3DCCD1}">
+            <a:ext uri="{909E8E84-426E-40dd-AFC4-6F175D3DCCD1}">
               <a14:hiddenFill xmlns:a14="http://schemas.microsoft.com/office/drawing/2010/main">
                 <a:noFill/>
               </a14:hiddenFill>
@@ -28144,7 +28143,7 @@
             <a:tailEnd/>
           </a:ln>
           <a:extLst>
-            <a:ext uri="{909E8E84-426E-40DD-AFC4-6F175D3DCCD1}">
+            <a:ext uri="{909E8E84-426E-40dd-AFC4-6F175D3DCCD1}">
               <a14:hiddenFill xmlns:a14="http://schemas.microsoft.com/office/drawing/2010/main">
                 <a:noFill/>
               </a14:hiddenFill>
@@ -28187,7 +28186,7 @@
             <a:tailEnd/>
           </a:ln>
           <a:extLst>
-            <a:ext uri="{909E8E84-426E-40DD-AFC4-6F175D3DCCD1}">
+            <a:ext uri="{909E8E84-426E-40dd-AFC4-6F175D3DCCD1}">
               <a14:hiddenFill xmlns:a14="http://schemas.microsoft.com/office/drawing/2010/main">
                 <a:noFill/>
               </a14:hiddenFill>
@@ -28230,7 +28229,7 @@
             <a:tailEnd/>
           </a:ln>
           <a:extLst>
-            <a:ext uri="{909E8E84-426E-40DD-AFC4-6F175D3DCCD1}">
+            <a:ext uri="{909E8E84-426E-40dd-AFC4-6F175D3DCCD1}">
               <a14:hiddenFill xmlns:a14="http://schemas.microsoft.com/office/drawing/2010/main">
                 <a:noFill/>
               </a14:hiddenFill>
@@ -28268,14 +28267,14 @@
             <a:noFill/>
           </a:ln>
           <a:extLst>
-            <a:ext uri="{909E8E84-426E-40DD-AFC4-6F175D3DCCD1}">
+            <a:ext uri="{909E8E84-426E-40dd-AFC4-6F175D3DCCD1}">
               <a14:hiddenFill xmlns:a14="http://schemas.microsoft.com/office/drawing/2010/main">
                 <a:solidFill>
                   <a:srgbClr val="FFFFFF"/>
                 </a:solidFill>
               </a14:hiddenFill>
             </a:ext>
-            <a:ext uri="{91240B29-F687-4F45-9708-019B960494DF}">
+            <a:ext uri="{91240B29-F687-4f45-9708-019B960494DF}">
               <a14:hiddenLine xmlns:a14="http://schemas.microsoft.com/office/drawing/2010/main" w="12700">
                 <a:solidFill>
                   <a:srgbClr val="000000"/>
@@ -28432,14 +28431,14 @@
             <a:noFill/>
           </a:ln>
           <a:extLst>
-            <a:ext uri="{909E8E84-426E-40DD-AFC4-6F175D3DCCD1}">
+            <a:ext uri="{909E8E84-426E-40dd-AFC4-6F175D3DCCD1}">
               <a14:hiddenFill xmlns:a14="http://schemas.microsoft.com/office/drawing/2010/main">
                 <a:solidFill>
                   <a:srgbClr val="FFFFFF"/>
                 </a:solidFill>
               </a14:hiddenFill>
             </a:ext>
-            <a:ext uri="{91240B29-F687-4F45-9708-019B960494DF}">
+            <a:ext uri="{91240B29-F687-4f45-9708-019B960494DF}">
               <a14:hiddenLine xmlns:a14="http://schemas.microsoft.com/office/drawing/2010/main" w="12700">
                 <a:solidFill>
                   <a:srgbClr val="000000"/>
@@ -28596,14 +28595,14 @@
             <a:noFill/>
           </a:ln>
           <a:extLst>
-            <a:ext uri="{909E8E84-426E-40DD-AFC4-6F175D3DCCD1}">
+            <a:ext uri="{909E8E84-426E-40dd-AFC4-6F175D3DCCD1}">
               <a14:hiddenFill xmlns:a14="http://schemas.microsoft.com/office/drawing/2010/main">
                 <a:solidFill>
                   <a:srgbClr val="FFFFFF"/>
                 </a:solidFill>
               </a14:hiddenFill>
             </a:ext>
-            <a:ext uri="{91240B29-F687-4F45-9708-019B960494DF}">
+            <a:ext uri="{91240B29-F687-4f45-9708-019B960494DF}">
               <a14:hiddenLine xmlns:a14="http://schemas.microsoft.com/office/drawing/2010/main" w="12700">
                 <a:solidFill>
                   <a:srgbClr val="000000"/>
@@ -28760,14 +28759,14 @@
             <a:noFill/>
           </a:ln>
           <a:extLst>
-            <a:ext uri="{909E8E84-426E-40DD-AFC4-6F175D3DCCD1}">
+            <a:ext uri="{909E8E84-426E-40dd-AFC4-6F175D3DCCD1}">
               <a14:hiddenFill xmlns:a14="http://schemas.microsoft.com/office/drawing/2010/main">
                 <a:solidFill>
                   <a:srgbClr val="FFFFFF"/>
                 </a:solidFill>
               </a14:hiddenFill>
             </a:ext>
-            <a:ext uri="{91240B29-F687-4F45-9708-019B960494DF}">
+            <a:ext uri="{91240B29-F687-4f45-9708-019B960494DF}">
               <a14:hiddenLine xmlns:a14="http://schemas.microsoft.com/office/drawing/2010/main" w="12700">
                 <a:solidFill>
                   <a:srgbClr val="000000"/>
@@ -28924,14 +28923,14 @@
             <a:noFill/>
           </a:ln>
           <a:extLst>
-            <a:ext uri="{909E8E84-426E-40DD-AFC4-6F175D3DCCD1}">
+            <a:ext uri="{909E8E84-426E-40dd-AFC4-6F175D3DCCD1}">
               <a14:hiddenFill xmlns:a14="http://schemas.microsoft.com/office/drawing/2010/main">
                 <a:solidFill>
                   <a:srgbClr val="FFFFFF"/>
                 </a:solidFill>
               </a14:hiddenFill>
             </a:ext>
-            <a:ext uri="{91240B29-F687-4F45-9708-019B960494DF}">
+            <a:ext uri="{91240B29-F687-4f45-9708-019B960494DF}">
               <a14:hiddenLine xmlns:a14="http://schemas.microsoft.com/office/drawing/2010/main" w="12700">
                 <a:solidFill>
                   <a:srgbClr val="000000"/>
@@ -29088,14 +29087,14 @@
             <a:noFill/>
           </a:ln>
           <a:extLst>
-            <a:ext uri="{909E8E84-426E-40DD-AFC4-6F175D3DCCD1}">
+            <a:ext uri="{909E8E84-426E-40dd-AFC4-6F175D3DCCD1}">
               <a14:hiddenFill xmlns:a14="http://schemas.microsoft.com/office/drawing/2010/main">
                 <a:solidFill>
                   <a:srgbClr val="FFFFFF"/>
                 </a:solidFill>
               </a14:hiddenFill>
             </a:ext>
-            <a:ext uri="{91240B29-F687-4F45-9708-019B960494DF}">
+            <a:ext uri="{91240B29-F687-4f45-9708-019B960494DF}">
               <a14:hiddenLine xmlns:a14="http://schemas.microsoft.com/office/drawing/2010/main" w="12700">
                 <a:solidFill>
                   <a:srgbClr val="000000"/>
@@ -29257,7 +29256,7 @@
             <a:tailEnd/>
           </a:ln>
           <a:extLst>
-            <a:ext uri="{909E8E84-426E-40DD-AFC4-6F175D3DCCD1}">
+            <a:ext uri="{909E8E84-426E-40dd-AFC4-6F175D3DCCD1}">
               <a14:hiddenFill xmlns:a14="http://schemas.microsoft.com/office/drawing/2010/main">
                 <a:noFill/>
               </a14:hiddenFill>
@@ -29300,7 +29299,7 @@
             <a:tailEnd/>
           </a:ln>
           <a:extLst>
-            <a:ext uri="{909E8E84-426E-40DD-AFC4-6F175D3DCCD1}">
+            <a:ext uri="{909E8E84-426E-40dd-AFC4-6F175D3DCCD1}">
               <a14:hiddenFill xmlns:a14="http://schemas.microsoft.com/office/drawing/2010/main">
                 <a:noFill/>
               </a14:hiddenFill>
@@ -29343,7 +29342,7 @@
             <a:tailEnd/>
           </a:ln>
           <a:extLst>
-            <a:ext uri="{909E8E84-426E-40DD-AFC4-6F175D3DCCD1}">
+            <a:ext uri="{909E8E84-426E-40dd-AFC4-6F175D3DCCD1}">
               <a14:hiddenFill xmlns:a14="http://schemas.microsoft.com/office/drawing/2010/main">
                 <a:noFill/>
               </a14:hiddenFill>
@@ -29386,7 +29385,7 @@
             <a:tailEnd/>
           </a:ln>
           <a:extLst>
-            <a:ext uri="{909E8E84-426E-40DD-AFC4-6F175D3DCCD1}">
+            <a:ext uri="{909E8E84-426E-40dd-AFC4-6F175D3DCCD1}">
               <a14:hiddenFill xmlns:a14="http://schemas.microsoft.com/office/drawing/2010/main">
                 <a:noFill/>
               </a14:hiddenFill>
@@ -29432,7 +29431,7 @@
             <a:tailEnd/>
           </a:ln>
           <a:extLst>
-            <a:ext uri="{909E8E84-426E-40DD-AFC4-6F175D3DCCD1}">
+            <a:ext uri="{909E8E84-426E-40dd-AFC4-6F175D3DCCD1}">
               <a14:hiddenFill xmlns:a14="http://schemas.microsoft.com/office/drawing/2010/main">
                 <a:solidFill>
                   <a:srgbClr val="FFFFFF"/>
@@ -29576,14 +29575,14 @@
             <a:noFill/>
           </a:ln>
           <a:extLst>
-            <a:ext uri="{909E8E84-426E-40DD-AFC4-6F175D3DCCD1}">
+            <a:ext uri="{909E8E84-426E-40dd-AFC4-6F175D3DCCD1}">
               <a14:hiddenFill xmlns:a14="http://schemas.microsoft.com/office/drawing/2010/main">
                 <a:solidFill>
                   <a:srgbClr val="FFFFFF"/>
                 </a:solidFill>
               </a14:hiddenFill>
             </a:ext>
-            <a:ext uri="{91240B29-F687-4F45-9708-019B960494DF}">
+            <a:ext uri="{91240B29-F687-4f45-9708-019B960494DF}">
               <a14:hiddenLine xmlns:a14="http://schemas.microsoft.com/office/drawing/2010/main" w="9525">
                 <a:solidFill>
                   <a:srgbClr val="000000"/>
@@ -29748,14 +29747,14 @@
             <a:noFill/>
           </a:ln>
           <a:extLst>
-            <a:ext uri="{909E8E84-426E-40DD-AFC4-6F175D3DCCD1}">
+            <a:ext uri="{909E8E84-426E-40dd-AFC4-6F175D3DCCD1}">
               <a14:hiddenFill xmlns:a14="http://schemas.microsoft.com/office/drawing/2010/main">
                 <a:solidFill>
                   <a:srgbClr val="FFFFFF"/>
                 </a:solidFill>
               </a14:hiddenFill>
             </a:ext>
-            <a:ext uri="{91240B29-F687-4F45-9708-019B960494DF}">
+            <a:ext uri="{91240B29-F687-4f45-9708-019B960494DF}">
               <a14:hiddenLine xmlns:a14="http://schemas.microsoft.com/office/drawing/2010/main" w="9525">
                 <a:solidFill>
                   <a:srgbClr val="000000"/>
@@ -29900,14 +29899,14 @@
           <a:noFill/>
           <a:ln/>
           <a:extLst>
-            <a:ext uri="{909E8E84-426E-40DD-AFC4-6F175D3DCCD1}">
+            <a:ext uri="{909E8E84-426E-40dd-AFC4-6F175D3DCCD1}">
               <a14:hiddenFill xmlns:a14="http://schemas.microsoft.com/office/drawing/2010/main">
                 <a:solidFill>
                   <a:srgbClr val="FFFFFF"/>
                 </a:solidFill>
               </a14:hiddenFill>
             </a:ext>
-            <a:ext uri="{91240B29-F687-4F45-9708-019B960494DF}">
+            <a:ext uri="{91240B29-F687-4f45-9708-019B960494DF}">
               <a14:hiddenLine xmlns:a14="http://schemas.microsoft.com/office/drawing/2010/main" w="9525">
                 <a:solidFill>
                   <a:srgbClr val="000000"/>
@@ -30059,14 +30058,14 @@
             <a:noFill/>
           </a:ln>
           <a:extLst>
-            <a:ext uri="{909E8E84-426E-40DD-AFC4-6F175D3DCCD1}">
+            <a:ext uri="{909E8E84-426E-40dd-AFC4-6F175D3DCCD1}">
               <a14:hiddenFill xmlns:a14="http://schemas.microsoft.com/office/drawing/2010/main">
                 <a:solidFill>
                   <a:srgbClr val="FFFFFF"/>
                 </a:solidFill>
               </a14:hiddenFill>
             </a:ext>
-            <a:ext uri="{91240B29-F687-4F45-9708-019B960494DF}">
+            <a:ext uri="{91240B29-F687-4f45-9708-019B960494DF}">
               <a14:hiddenLine xmlns:a14="http://schemas.microsoft.com/office/drawing/2010/main" w="9525">
                 <a:solidFill>
                   <a:srgbClr val="000000"/>
@@ -30196,11 +30195,7 @@
             </a:r>
             <a:r>
               <a:rPr lang="en-US" altLang="en-US" smtClean="0"/>
-              <a:t>(</a:t>
-            </a:r>
-            <a:r>
-              <a:rPr lang="en-US" altLang="en-US" smtClean="0"/>
-              <a:t>logs):</a:t>
+              <a:t>(logs):</a:t>
             </a:r>
             <a:endParaRPr lang="en-US" altLang="en-US"/>
           </a:p>
@@ -30214,7 +30209,7 @@
   <p:timing>
     <p:tnLst>
       <p:par>
-        <p:cTn id="1" dur="indefinite" restart="never" nodeType="tmRoot"/>
+        <p:cTn xmlns:p14="http://schemas.microsoft.com/office/powerpoint/2010/main" id="1" dur="indefinite" restart="never" nodeType="tmRoot"/>
       </p:par>
     </p:tnLst>
   </p:timing>
@@ -30252,14 +30247,14 @@
           <a:noFill/>
           <a:ln/>
           <a:extLst>
-            <a:ext uri="{909E8E84-426E-40DD-AFC4-6F175D3DCCD1}">
+            <a:ext uri="{909E8E84-426E-40dd-AFC4-6F175D3DCCD1}">
               <a14:hiddenFill xmlns:a14="http://schemas.microsoft.com/office/drawing/2010/main">
                 <a:solidFill>
                   <a:srgbClr val="FFFFFF"/>
                 </a:solidFill>
               </a14:hiddenFill>
             </a:ext>
-            <a:ext uri="{91240B29-F687-4F45-9708-019B960494DF}">
+            <a:ext uri="{91240B29-F687-4f45-9708-019B960494DF}">
               <a14:hiddenLine xmlns:a14="http://schemas.microsoft.com/office/drawing/2010/main" w="9525">
                 <a:solidFill>
                   <a:srgbClr val="000000"/>
@@ -30465,14 +30460,14 @@
           <a:noFill/>
           <a:ln/>
           <a:extLst>
-            <a:ext uri="{909E8E84-426E-40DD-AFC4-6F175D3DCCD1}">
+            <a:ext uri="{909E8E84-426E-40dd-AFC4-6F175D3DCCD1}">
               <a14:hiddenFill xmlns:a14="http://schemas.microsoft.com/office/drawing/2010/main">
                 <a:solidFill>
                   <a:srgbClr val="FFFFFF"/>
                 </a:solidFill>
               </a14:hiddenFill>
             </a:ext>
-            <a:ext uri="{91240B29-F687-4F45-9708-019B960494DF}">
+            <a:ext uri="{91240B29-F687-4f45-9708-019B960494DF}">
               <a14:hiddenLine xmlns:a14="http://schemas.microsoft.com/office/drawing/2010/main" w="9525">
                 <a:solidFill>
                   <a:srgbClr val="000000"/>
@@ -30639,14 +30634,14 @@
             <a:noFill/>
           </a:ln>
           <a:extLst>
-            <a:ext uri="{909E8E84-426E-40DD-AFC4-6F175D3DCCD1}">
+            <a:ext uri="{909E8E84-426E-40dd-AFC4-6F175D3DCCD1}">
               <a14:hiddenFill xmlns:a14="http://schemas.microsoft.com/office/drawing/2010/main">
                 <a:solidFill>
                   <a:srgbClr val="FFFFFF"/>
                 </a:solidFill>
               </a14:hiddenFill>
             </a:ext>
-            <a:ext uri="{91240B29-F687-4F45-9708-019B960494DF}">
+            <a:ext uri="{91240B29-F687-4f45-9708-019B960494DF}">
               <a14:hiddenLine xmlns:a14="http://schemas.microsoft.com/office/drawing/2010/main" w="9525">
                 <a:solidFill>
                   <a:srgbClr val="000000"/>
@@ -30693,14 +30688,14 @@
             <a:noFill/>
           </a:ln>
           <a:extLst>
-            <a:ext uri="{909E8E84-426E-40DD-AFC4-6F175D3DCCD1}">
+            <a:ext uri="{909E8E84-426E-40dd-AFC4-6F175D3DCCD1}">
               <a14:hiddenFill xmlns:a14="http://schemas.microsoft.com/office/drawing/2010/main">
                 <a:solidFill>
                   <a:srgbClr val="FFFFFF"/>
                 </a:solidFill>
               </a14:hiddenFill>
             </a:ext>
-            <a:ext uri="{91240B29-F687-4F45-9708-019B960494DF}">
+            <a:ext uri="{91240B29-F687-4f45-9708-019B960494DF}">
               <a14:hiddenLine xmlns:a14="http://schemas.microsoft.com/office/drawing/2010/main" w="9525">
                 <a:solidFill>
                   <a:srgbClr val="000000"/>
@@ -30721,7 +30716,7 @@
   <p:timing>
     <p:tnLst>
       <p:par>
-        <p:cTn id="1" dur="indefinite" restart="never" nodeType="tmRoot"/>
+        <p:cTn xmlns:p14="http://schemas.microsoft.com/office/powerpoint/2010/main" id="1" dur="indefinite" restart="never" nodeType="tmRoot"/>
       </p:par>
     </p:tnLst>
   </p:timing>
@@ -30759,14 +30754,14 @@
           <a:noFill/>
           <a:ln/>
           <a:extLst>
-            <a:ext uri="{909E8E84-426E-40DD-AFC4-6F175D3DCCD1}">
+            <a:ext uri="{909E8E84-426E-40dd-AFC4-6F175D3DCCD1}">
               <a14:hiddenFill xmlns:a14="http://schemas.microsoft.com/office/drawing/2010/main">
                 <a:solidFill>
                   <a:srgbClr val="FFFFFF"/>
                 </a:solidFill>
               </a14:hiddenFill>
             </a:ext>
-            <a:ext uri="{91240B29-F687-4F45-9708-019B960494DF}">
+            <a:ext uri="{91240B29-F687-4f45-9708-019B960494DF}">
               <a14:hiddenLine xmlns:a14="http://schemas.microsoft.com/office/drawing/2010/main" w="9525">
                 <a:solidFill>
                   <a:srgbClr val="000000"/>
@@ -30963,14 +30958,14 @@
           <a:noFill/>
           <a:ln/>
           <a:extLst>
-            <a:ext uri="{909E8E84-426E-40DD-AFC4-6F175D3DCCD1}">
+            <a:ext uri="{909E8E84-426E-40dd-AFC4-6F175D3DCCD1}">
               <a14:hiddenFill xmlns:a14="http://schemas.microsoft.com/office/drawing/2010/main">
                 <a:solidFill>
                   <a:srgbClr val="FFFFFF"/>
                 </a:solidFill>
               </a14:hiddenFill>
             </a:ext>
-            <a:ext uri="{91240B29-F687-4F45-9708-019B960494DF}">
+            <a:ext uri="{91240B29-F687-4f45-9708-019B960494DF}">
               <a14:hiddenLine xmlns:a14="http://schemas.microsoft.com/office/drawing/2010/main" w="9525">
                 <a:solidFill>
                   <a:srgbClr val="000000"/>
@@ -31109,7 +31104,7 @@
   <p:timing>
     <p:tnLst>
       <p:par>
-        <p:cTn id="1" dur="indefinite" restart="never" nodeType="tmRoot"/>
+        <p:cTn xmlns:p14="http://schemas.microsoft.com/office/powerpoint/2010/main" id="1" dur="indefinite" restart="never" nodeType="tmRoot"/>
       </p:par>
     </p:tnLst>
   </p:timing>

</xml_diff>